<commit_message>
Changes to PowerPoint and code
</commit_message>
<xml_diff>
--- a/Linear Regression with ecommerce data.pptx
+++ b/Linear Regression with ecommerce data.pptx
@@ -6,8 +6,13 @@
   </p:sldMasterIdLst>
   <p:sldIdLst>
     <p:sldId id="256" r:id="rId2"/>
-    <p:sldId id="257" r:id="rId3"/>
+    <p:sldId id="262" r:id="rId3"/>
     <p:sldId id="258" r:id="rId4"/>
+    <p:sldId id="259" r:id="rId5"/>
+    <p:sldId id="260" r:id="rId6"/>
+    <p:sldId id="261" r:id="rId7"/>
+    <p:sldId id="263" r:id="rId8"/>
+    <p:sldId id="264" r:id="rId9"/>
   </p:sldIdLst>
   <p:sldSz cx="12192000" cy="6858000"/>
   <p:notesSz cx="6858000" cy="9144000"/>
@@ -106,7 +111,327 @@
       </a:defRPr>
     </a:lvl9pPr>
   </p:defaultTextStyle>
+  <p:extLst>
+    <p:ext uri="{EFAFB233-063F-42B5-8137-9DF3F51BA10A}">
+      <p15:sldGuideLst xmlns:p15="http://schemas.microsoft.com/office/powerpoint/2012/main"/>
+    </p:ext>
+  </p:extLst>
 </p:presentation>
+</file>
+
+<file path=ppt/revisionInfo.xml><?xml version="1.0" encoding="utf-8"?>
+<p1510:revInfo xmlns:a="http://schemas.openxmlformats.org/drawingml/2006/main" xmlns:r="http://schemas.openxmlformats.org/officeDocument/2006/relationships" xmlns:p1510="http://schemas.microsoft.com/office/powerpoint/2015/10/main">
+  <p1510:revLst>
+    <p1510:client id="{2A1ABEDB-2DB3-47AC-BD43-550398659DD8}" v="2" dt="2025-08-01T19:07:32.116"/>
+  </p1510:revLst>
+</p1510:revInfo>
+</file>
+
+<file path=ppt/changesInfos/changesInfo1.xml><?xml version="1.0" encoding="utf-8"?>
+<pc:chgInfo xmlns:a="http://schemas.openxmlformats.org/drawingml/2006/main" xmlns:r="http://schemas.openxmlformats.org/officeDocument/2006/relationships" xmlns:ac="http://schemas.microsoft.com/office/drawing/2013/main/command" xmlns:pc="http://schemas.microsoft.com/office/powerpoint/2013/main/command">
+  <pc:docChgLst>
+    <pc:chgData name="keside unegbu" userId="223b0cbcc437c8de" providerId="LiveId" clId="{2A1ABEDB-2DB3-47AC-BD43-550398659DD8}"/>
+    <pc:docChg chg="undo custSel addSld delSld modSld">
+      <pc:chgData name="keside unegbu" userId="223b0cbcc437c8de" providerId="LiveId" clId="{2A1ABEDB-2DB3-47AC-BD43-550398659DD8}" dt="2025-08-01T19:08:30.084" v="561" actId="14100"/>
+      <pc:docMkLst>
+        <pc:docMk/>
+      </pc:docMkLst>
+      <pc:sldChg chg="del">
+        <pc:chgData name="keside unegbu" userId="223b0cbcc437c8de" providerId="LiveId" clId="{2A1ABEDB-2DB3-47AC-BD43-550398659DD8}" dt="2025-08-01T18:59:24.122" v="391" actId="47"/>
+        <pc:sldMkLst>
+          <pc:docMk/>
+          <pc:sldMk cId="1281965531" sldId="257"/>
+        </pc:sldMkLst>
+      </pc:sldChg>
+      <pc:sldChg chg="new del">
+        <pc:chgData name="keside unegbu" userId="223b0cbcc437c8de" providerId="LiveId" clId="{2A1ABEDB-2DB3-47AC-BD43-550398659DD8}" dt="2025-08-01T18:22:48.913" v="7" actId="47"/>
+        <pc:sldMkLst>
+          <pc:docMk/>
+          <pc:sldMk cId="2681388493" sldId="259"/>
+        </pc:sldMkLst>
+      </pc:sldChg>
+      <pc:sldChg chg="addSp delSp modSp new mod setBg">
+        <pc:chgData name="keside unegbu" userId="223b0cbcc437c8de" providerId="LiveId" clId="{2A1ABEDB-2DB3-47AC-BD43-550398659DD8}" dt="2025-08-01T18:58:05.128" v="355" actId="20577"/>
+        <pc:sldMkLst>
+          <pc:docMk/>
+          <pc:sldMk cId="3784430539" sldId="259"/>
+        </pc:sldMkLst>
+        <pc:spChg chg="mod">
+          <ac:chgData name="keside unegbu" userId="223b0cbcc437c8de" providerId="LiveId" clId="{2A1ABEDB-2DB3-47AC-BD43-550398659DD8}" dt="2025-08-01T18:57:11.743" v="246" actId="26606"/>
+          <ac:spMkLst>
+            <pc:docMk/>
+            <pc:sldMk cId="3784430539" sldId="259"/>
+            <ac:spMk id="2" creationId="{3FF9D074-5D3A-4E8C-DC7B-7826EA19D439}"/>
+          </ac:spMkLst>
+        </pc:spChg>
+        <pc:spChg chg="del">
+          <ac:chgData name="keside unegbu" userId="223b0cbcc437c8de" providerId="LiveId" clId="{2A1ABEDB-2DB3-47AC-BD43-550398659DD8}" dt="2025-08-01T18:25:34.675" v="51" actId="22"/>
+          <ac:spMkLst>
+            <pc:docMk/>
+            <pc:sldMk cId="3784430539" sldId="259"/>
+            <ac:spMk id="3" creationId="{AB647F9B-9035-66D3-D786-095B3F90C8F8}"/>
+          </ac:spMkLst>
+        </pc:spChg>
+        <pc:spChg chg="mod">
+          <ac:chgData name="keside unegbu" userId="223b0cbcc437c8de" providerId="LiveId" clId="{2A1ABEDB-2DB3-47AC-BD43-550398659DD8}" dt="2025-08-01T18:58:05.128" v="355" actId="20577"/>
+          <ac:spMkLst>
+            <pc:docMk/>
+            <pc:sldMk cId="3784430539" sldId="259"/>
+            <ac:spMk id="4" creationId="{E9CFC8D2-0D3C-2624-7230-A921B8958B33}"/>
+          </ac:spMkLst>
+        </pc:spChg>
+        <pc:spChg chg="add del">
+          <ac:chgData name="keside unegbu" userId="223b0cbcc437c8de" providerId="LiveId" clId="{2A1ABEDB-2DB3-47AC-BD43-550398659DD8}" dt="2025-08-01T18:57:11.727" v="245" actId="26606"/>
+          <ac:spMkLst>
+            <pc:docMk/>
+            <pc:sldMk cId="3784430539" sldId="259"/>
+            <ac:spMk id="15" creationId="{AD96FDFD-4E42-4A06-B8B5-768A1DB9C2A9}"/>
+          </ac:spMkLst>
+        </pc:spChg>
+        <pc:spChg chg="add">
+          <ac:chgData name="keside unegbu" userId="223b0cbcc437c8de" providerId="LiveId" clId="{2A1ABEDB-2DB3-47AC-BD43-550398659DD8}" dt="2025-08-01T18:57:11.743" v="246" actId="26606"/>
+          <ac:spMkLst>
+            <pc:docMk/>
+            <pc:sldMk cId="3784430539" sldId="259"/>
+            <ac:spMk id="20" creationId="{4DD35268-6FBE-0BCD-C050-3F804C7C54A2}"/>
+          </ac:spMkLst>
+        </pc:spChg>
+        <pc:grpChg chg="add">
+          <ac:chgData name="keside unegbu" userId="223b0cbcc437c8de" providerId="LiveId" clId="{2A1ABEDB-2DB3-47AC-BD43-550398659DD8}" dt="2025-08-01T18:57:11.743" v="246" actId="26606"/>
+          <ac:grpSpMkLst>
+            <pc:docMk/>
+            <pc:sldMk cId="3784430539" sldId="259"/>
+            <ac:grpSpMk id="17" creationId="{F3A0B02E-2A29-A1CD-0D60-A9E1681AF3C7}"/>
+          </ac:grpSpMkLst>
+        </pc:grpChg>
+        <pc:picChg chg="add mod ord">
+          <ac:chgData name="keside unegbu" userId="223b0cbcc437c8de" providerId="LiveId" clId="{2A1ABEDB-2DB3-47AC-BD43-550398659DD8}" dt="2025-08-01T18:57:11.743" v="246" actId="26606"/>
+          <ac:picMkLst>
+            <pc:docMk/>
+            <pc:sldMk cId="3784430539" sldId="259"/>
+            <ac:picMk id="6" creationId="{A989E515-E22D-A874-6FA2-7CA060120822}"/>
+          </ac:picMkLst>
+        </pc:picChg>
+        <pc:picChg chg="add mod ord">
+          <ac:chgData name="keside unegbu" userId="223b0cbcc437c8de" providerId="LiveId" clId="{2A1ABEDB-2DB3-47AC-BD43-550398659DD8}" dt="2025-08-01T18:57:11.743" v="246" actId="26606"/>
+          <ac:picMkLst>
+            <pc:docMk/>
+            <pc:sldMk cId="3784430539" sldId="259"/>
+            <ac:picMk id="8" creationId="{00733B3A-7037-66A5-544E-BB365D175360}"/>
+          </ac:picMkLst>
+        </pc:picChg>
+        <pc:picChg chg="add mod">
+          <ac:chgData name="keside unegbu" userId="223b0cbcc437c8de" providerId="LiveId" clId="{2A1ABEDB-2DB3-47AC-BD43-550398659DD8}" dt="2025-08-01T18:57:11.743" v="246" actId="26606"/>
+          <ac:picMkLst>
+            <pc:docMk/>
+            <pc:sldMk cId="3784430539" sldId="259"/>
+            <ac:picMk id="10" creationId="{AA1CAFCD-AEB9-C75C-883E-D1DC6B66E09E}"/>
+          </ac:picMkLst>
+        </pc:picChg>
+      </pc:sldChg>
+      <pc:sldChg chg="new del">
+        <pc:chgData name="keside unegbu" userId="223b0cbcc437c8de" providerId="LiveId" clId="{2A1ABEDB-2DB3-47AC-BD43-550398659DD8}" dt="2025-08-01T18:22:39.610" v="5" actId="47"/>
+        <pc:sldMkLst>
+          <pc:docMk/>
+          <pc:sldMk cId="4196432424" sldId="259"/>
+        </pc:sldMkLst>
+      </pc:sldChg>
+      <pc:sldChg chg="addSp delSp modSp new mod">
+        <pc:chgData name="keside unegbu" userId="223b0cbcc437c8de" providerId="LiveId" clId="{2A1ABEDB-2DB3-47AC-BD43-550398659DD8}" dt="2025-08-01T18:59:51.419" v="396" actId="122"/>
+        <pc:sldMkLst>
+          <pc:docMk/>
+          <pc:sldMk cId="1701651803" sldId="260"/>
+        </pc:sldMkLst>
+        <pc:spChg chg="mod">
+          <ac:chgData name="keside unegbu" userId="223b0cbcc437c8de" providerId="LiveId" clId="{2A1ABEDB-2DB3-47AC-BD43-550398659DD8}" dt="2025-08-01T18:59:51.419" v="396" actId="122"/>
+          <ac:spMkLst>
+            <pc:docMk/>
+            <pc:sldMk cId="1701651803" sldId="260"/>
+            <ac:spMk id="2" creationId="{FBEF5D87-74F0-B65F-5CB0-03D765349F64}"/>
+          </ac:spMkLst>
+        </pc:spChg>
+        <pc:spChg chg="del">
+          <ac:chgData name="keside unegbu" userId="223b0cbcc437c8de" providerId="LiveId" clId="{2A1ABEDB-2DB3-47AC-BD43-550398659DD8}" dt="2025-08-01T18:59:28.644" v="392" actId="22"/>
+          <ac:spMkLst>
+            <pc:docMk/>
+            <pc:sldMk cId="1701651803" sldId="260"/>
+            <ac:spMk id="3" creationId="{B3823878-00F5-B9D8-69E8-7BC5A83333E3}"/>
+          </ac:spMkLst>
+        </pc:spChg>
+        <pc:picChg chg="add mod ord">
+          <ac:chgData name="keside unegbu" userId="223b0cbcc437c8de" providerId="LiveId" clId="{2A1ABEDB-2DB3-47AC-BD43-550398659DD8}" dt="2025-08-01T18:59:47.568" v="395" actId="1076"/>
+          <ac:picMkLst>
+            <pc:docMk/>
+            <pc:sldMk cId="1701651803" sldId="260"/>
+            <ac:picMk id="5" creationId="{01030FAB-C9AA-C6F8-A963-C1142572BB49}"/>
+          </ac:picMkLst>
+        </pc:picChg>
+      </pc:sldChg>
+      <pc:sldChg chg="add del">
+        <pc:chgData name="keside unegbu" userId="223b0cbcc437c8de" providerId="LiveId" clId="{2A1ABEDB-2DB3-47AC-BD43-550398659DD8}" dt="2025-08-01T18:22:39.038" v="4" actId="47"/>
+        <pc:sldMkLst>
+          <pc:docMk/>
+          <pc:sldMk cId="3177216666" sldId="260"/>
+        </pc:sldMkLst>
+      </pc:sldChg>
+      <pc:sldChg chg="addSp delSp modSp new mod setBg">
+        <pc:chgData name="keside unegbu" userId="223b0cbcc437c8de" providerId="LiveId" clId="{2A1ABEDB-2DB3-47AC-BD43-550398659DD8}" dt="2025-08-01T19:01:03.115" v="417" actId="26606"/>
+        <pc:sldMkLst>
+          <pc:docMk/>
+          <pc:sldMk cId="939207995" sldId="261"/>
+        </pc:sldMkLst>
+        <pc:spChg chg="mod">
+          <ac:chgData name="keside unegbu" userId="223b0cbcc437c8de" providerId="LiveId" clId="{2A1ABEDB-2DB3-47AC-BD43-550398659DD8}" dt="2025-08-01T19:01:03.115" v="417" actId="26606"/>
+          <ac:spMkLst>
+            <pc:docMk/>
+            <pc:sldMk cId="939207995" sldId="261"/>
+            <ac:spMk id="2" creationId="{7865DA95-FE2C-FBE2-4CB1-EC5270181F83}"/>
+          </ac:spMkLst>
+        </pc:spChg>
+        <pc:spChg chg="del">
+          <ac:chgData name="keside unegbu" userId="223b0cbcc437c8de" providerId="LiveId" clId="{2A1ABEDB-2DB3-47AC-BD43-550398659DD8}" dt="2025-08-01T19:00:52.055" v="416" actId="22"/>
+          <ac:spMkLst>
+            <pc:docMk/>
+            <pc:sldMk cId="939207995" sldId="261"/>
+            <ac:spMk id="3" creationId="{E6D508A0-D449-46BA-DC52-9C122E71B582}"/>
+          </ac:spMkLst>
+        </pc:spChg>
+        <pc:spChg chg="add">
+          <ac:chgData name="keside unegbu" userId="223b0cbcc437c8de" providerId="LiveId" clId="{2A1ABEDB-2DB3-47AC-BD43-550398659DD8}" dt="2025-08-01T19:01:03.115" v="417" actId="26606"/>
+          <ac:spMkLst>
+            <pc:docMk/>
+            <pc:sldMk cId="939207995" sldId="261"/>
+            <ac:spMk id="10" creationId="{6753252F-4873-4F63-801D-CC719279A7D5}"/>
+          </ac:spMkLst>
+        </pc:spChg>
+        <pc:spChg chg="add">
+          <ac:chgData name="keside unegbu" userId="223b0cbcc437c8de" providerId="LiveId" clId="{2A1ABEDB-2DB3-47AC-BD43-550398659DD8}" dt="2025-08-01T19:01:03.115" v="417" actId="26606"/>
+          <ac:spMkLst>
+            <pc:docMk/>
+            <pc:sldMk cId="939207995" sldId="261"/>
+            <ac:spMk id="12" creationId="{047C8CCB-F95D-4249-92DD-651249D3535A}"/>
+          </ac:spMkLst>
+        </pc:spChg>
+        <pc:picChg chg="add mod ord">
+          <ac:chgData name="keside unegbu" userId="223b0cbcc437c8de" providerId="LiveId" clId="{2A1ABEDB-2DB3-47AC-BD43-550398659DD8}" dt="2025-08-01T19:01:03.115" v="417" actId="26606"/>
+          <ac:picMkLst>
+            <pc:docMk/>
+            <pc:sldMk cId="939207995" sldId="261"/>
+            <ac:picMk id="5" creationId="{DB17AD2B-3A8C-7673-1758-C4851742EF18}"/>
+          </ac:picMkLst>
+        </pc:picChg>
+      </pc:sldChg>
+      <pc:sldChg chg="add del">
+        <pc:chgData name="keside unegbu" userId="223b0cbcc437c8de" providerId="LiveId" clId="{2A1ABEDB-2DB3-47AC-BD43-550398659DD8}" dt="2025-08-01T18:22:38.482" v="3" actId="47"/>
+        <pc:sldMkLst>
+          <pc:docMk/>
+          <pc:sldMk cId="2759159715" sldId="261"/>
+        </pc:sldMkLst>
+      </pc:sldChg>
+      <pc:sldChg chg="modSp new mod">
+        <pc:chgData name="keside unegbu" userId="223b0cbcc437c8de" providerId="LiveId" clId="{2A1ABEDB-2DB3-47AC-BD43-550398659DD8}" dt="2025-08-01T19:05:33.054" v="473" actId="33524"/>
+        <pc:sldMkLst>
+          <pc:docMk/>
+          <pc:sldMk cId="1469113360" sldId="262"/>
+        </pc:sldMkLst>
+        <pc:spChg chg="mod">
+          <ac:chgData name="keside unegbu" userId="223b0cbcc437c8de" providerId="LiveId" clId="{2A1ABEDB-2DB3-47AC-BD43-550398659DD8}" dt="2025-08-01T19:01:20.543" v="431" actId="20577"/>
+          <ac:spMkLst>
+            <pc:docMk/>
+            <pc:sldMk cId="1469113360" sldId="262"/>
+            <ac:spMk id="2" creationId="{0C7D48AD-2CC6-48C7-E989-B29FF486C057}"/>
+          </ac:spMkLst>
+        </pc:spChg>
+        <pc:spChg chg="mod">
+          <ac:chgData name="keside unegbu" userId="223b0cbcc437c8de" providerId="LiveId" clId="{2A1ABEDB-2DB3-47AC-BD43-550398659DD8}" dt="2025-08-01T19:05:33.054" v="473" actId="33524"/>
+          <ac:spMkLst>
+            <pc:docMk/>
+            <pc:sldMk cId="1469113360" sldId="262"/>
+            <ac:spMk id="3" creationId="{AA1C0C05-9DB1-8250-BD65-398B3EFC7280}"/>
+          </ac:spMkLst>
+        </pc:spChg>
+      </pc:sldChg>
+      <pc:sldChg chg="addSp delSp modSp new mod">
+        <pc:chgData name="keside unegbu" userId="223b0cbcc437c8de" providerId="LiveId" clId="{2A1ABEDB-2DB3-47AC-BD43-550398659DD8}" dt="2025-08-01T19:04:43.823" v="465" actId="14100"/>
+        <pc:sldMkLst>
+          <pc:docMk/>
+          <pc:sldMk cId="3593044354" sldId="263"/>
+        </pc:sldMkLst>
+        <pc:spChg chg="mod">
+          <ac:chgData name="keside unegbu" userId="223b0cbcc437c8de" providerId="LiveId" clId="{2A1ABEDB-2DB3-47AC-BD43-550398659DD8}" dt="2025-08-01T19:02:46.757" v="458" actId="122"/>
+          <ac:spMkLst>
+            <pc:docMk/>
+            <pc:sldMk cId="3593044354" sldId="263"/>
+            <ac:spMk id="2" creationId="{CB41B99E-A151-386A-2D82-899B4E94D42E}"/>
+          </ac:spMkLst>
+        </pc:spChg>
+        <pc:spChg chg="del">
+          <ac:chgData name="keside unegbu" userId="223b0cbcc437c8de" providerId="LiveId" clId="{2A1ABEDB-2DB3-47AC-BD43-550398659DD8}" dt="2025-08-01T19:02:48.776" v="459" actId="22"/>
+          <ac:spMkLst>
+            <pc:docMk/>
+            <pc:sldMk cId="3593044354" sldId="263"/>
+            <ac:spMk id="3" creationId="{FAA613AC-FEFE-99E1-894D-20FC0DCC2BC5}"/>
+          </ac:spMkLst>
+        </pc:spChg>
+        <pc:spChg chg="del">
+          <ac:chgData name="keside unegbu" userId="223b0cbcc437c8de" providerId="LiveId" clId="{2A1ABEDB-2DB3-47AC-BD43-550398659DD8}" dt="2025-08-01T19:04:30.268" v="462" actId="22"/>
+          <ac:spMkLst>
+            <pc:docMk/>
+            <pc:sldMk cId="3593044354" sldId="263"/>
+            <ac:spMk id="4" creationId="{D9262F92-4A8C-3C5E-784A-BC9F591FDC9D}"/>
+          </ac:spMkLst>
+        </pc:spChg>
+        <pc:picChg chg="add mod ord">
+          <ac:chgData name="keside unegbu" userId="223b0cbcc437c8de" providerId="LiveId" clId="{2A1ABEDB-2DB3-47AC-BD43-550398659DD8}" dt="2025-08-01T19:02:55.622" v="461" actId="14100"/>
+          <ac:picMkLst>
+            <pc:docMk/>
+            <pc:sldMk cId="3593044354" sldId="263"/>
+            <ac:picMk id="6" creationId="{2EFFB206-39E2-61A0-D9D4-1139DE265F75}"/>
+          </ac:picMkLst>
+        </pc:picChg>
+        <pc:picChg chg="add mod ord">
+          <ac:chgData name="keside unegbu" userId="223b0cbcc437c8de" providerId="LiveId" clId="{2A1ABEDB-2DB3-47AC-BD43-550398659DD8}" dt="2025-08-01T19:04:43.823" v="465" actId="14100"/>
+          <ac:picMkLst>
+            <pc:docMk/>
+            <pc:sldMk cId="3593044354" sldId="263"/>
+            <ac:picMk id="8" creationId="{8B798E46-6C64-51AA-5264-020458B22DDA}"/>
+          </ac:picMkLst>
+        </pc:picChg>
+      </pc:sldChg>
+      <pc:sldChg chg="addSp modSp new mod">
+        <pc:chgData name="keside unegbu" userId="223b0cbcc437c8de" providerId="LiveId" clId="{2A1ABEDB-2DB3-47AC-BD43-550398659DD8}" dt="2025-08-01T19:08:30.084" v="561" actId="14100"/>
+        <pc:sldMkLst>
+          <pc:docMk/>
+          <pc:sldMk cId="1164507845" sldId="264"/>
+        </pc:sldMkLst>
+        <pc:spChg chg="mod">
+          <ac:chgData name="keside unegbu" userId="223b0cbcc437c8de" providerId="LiveId" clId="{2A1ABEDB-2DB3-47AC-BD43-550398659DD8}" dt="2025-08-01T19:05:51.339" v="485" actId="20577"/>
+          <ac:spMkLst>
+            <pc:docMk/>
+            <pc:sldMk cId="1164507845" sldId="264"/>
+            <ac:spMk id="2" creationId="{770FF0E1-5482-2020-EEF1-8DCBFCF88CD5}"/>
+          </ac:spMkLst>
+        </pc:spChg>
+        <pc:spChg chg="mod">
+          <ac:chgData name="keside unegbu" userId="223b0cbcc437c8de" providerId="LiveId" clId="{2A1ABEDB-2DB3-47AC-BD43-550398659DD8}" dt="2025-08-01T19:07:42.328" v="556" actId="27636"/>
+          <ac:spMkLst>
+            <pc:docMk/>
+            <pc:sldMk cId="1164507845" sldId="264"/>
+            <ac:spMk id="3" creationId="{8B2C12D1-EE1B-D175-BCD1-0ABFC6E16D91}"/>
+          </ac:spMkLst>
+        </pc:spChg>
+        <pc:picChg chg="add mod">
+          <ac:chgData name="keside unegbu" userId="223b0cbcc437c8de" providerId="LiveId" clId="{2A1ABEDB-2DB3-47AC-BD43-550398659DD8}" dt="2025-08-01T19:08:30.084" v="561" actId="14100"/>
+          <ac:picMkLst>
+            <pc:docMk/>
+            <pc:sldMk cId="1164507845" sldId="264"/>
+            <ac:picMk id="5" creationId="{D479323F-A06F-1524-7E03-D210B937F85B}"/>
+          </ac:picMkLst>
+        </pc:picChg>
+      </pc:sldChg>
+    </pc:docChg>
+  </pc:docChgLst>
+</pc:chgInfo>
 </file>
 
 <file path=ppt/slideLayouts/slideLayout1.xml><?xml version="1.0" encoding="utf-8"?>
@@ -256,7 +581,7 @@
           <a:p>
             <a:fld id="{BD2A41D9-64DF-42AE-8CA0-C087F888F636}" type="datetimeFigureOut">
               <a:rPr lang="en-US" smtClean="0"/>
-              <a:t>7/25/2025</a:t>
+              <a:t>8/1/2025</a:t>
             </a:fld>
             <a:endParaRPr lang="en-US"/>
           </a:p>
@@ -454,7 +779,7 @@
           <a:p>
             <a:fld id="{BD2A41D9-64DF-42AE-8CA0-C087F888F636}" type="datetimeFigureOut">
               <a:rPr lang="en-US" smtClean="0"/>
-              <a:t>7/25/2025</a:t>
+              <a:t>8/1/2025</a:t>
             </a:fld>
             <a:endParaRPr lang="en-US"/>
           </a:p>
@@ -662,7 +987,7 @@
           <a:p>
             <a:fld id="{BD2A41D9-64DF-42AE-8CA0-C087F888F636}" type="datetimeFigureOut">
               <a:rPr lang="en-US" smtClean="0"/>
-              <a:t>7/25/2025</a:t>
+              <a:t>8/1/2025</a:t>
             </a:fld>
             <a:endParaRPr lang="en-US"/>
           </a:p>
@@ -860,7 +1185,7 @@
           <a:p>
             <a:fld id="{BD2A41D9-64DF-42AE-8CA0-C087F888F636}" type="datetimeFigureOut">
               <a:rPr lang="en-US" smtClean="0"/>
-              <a:t>7/25/2025</a:t>
+              <a:t>8/1/2025</a:t>
             </a:fld>
             <a:endParaRPr lang="en-US"/>
           </a:p>
@@ -1135,7 +1460,7 @@
           <a:p>
             <a:fld id="{BD2A41D9-64DF-42AE-8CA0-C087F888F636}" type="datetimeFigureOut">
               <a:rPr lang="en-US" smtClean="0"/>
-              <a:t>7/25/2025</a:t>
+              <a:t>8/1/2025</a:t>
             </a:fld>
             <a:endParaRPr lang="en-US"/>
           </a:p>
@@ -1400,7 +1725,7 @@
           <a:p>
             <a:fld id="{BD2A41D9-64DF-42AE-8CA0-C087F888F636}" type="datetimeFigureOut">
               <a:rPr lang="en-US" smtClean="0"/>
-              <a:t>7/25/2025</a:t>
+              <a:t>8/1/2025</a:t>
             </a:fld>
             <a:endParaRPr lang="en-US"/>
           </a:p>
@@ -1812,7 +2137,7 @@
           <a:p>
             <a:fld id="{BD2A41D9-64DF-42AE-8CA0-C087F888F636}" type="datetimeFigureOut">
               <a:rPr lang="en-US" smtClean="0"/>
-              <a:t>7/25/2025</a:t>
+              <a:t>8/1/2025</a:t>
             </a:fld>
             <a:endParaRPr lang="en-US"/>
           </a:p>
@@ -1953,7 +2278,7 @@
           <a:p>
             <a:fld id="{BD2A41D9-64DF-42AE-8CA0-C087F888F636}" type="datetimeFigureOut">
               <a:rPr lang="en-US" smtClean="0"/>
-              <a:t>7/25/2025</a:t>
+              <a:t>8/1/2025</a:t>
             </a:fld>
             <a:endParaRPr lang="en-US"/>
           </a:p>
@@ -2066,7 +2391,7 @@
           <a:p>
             <a:fld id="{BD2A41D9-64DF-42AE-8CA0-C087F888F636}" type="datetimeFigureOut">
               <a:rPr lang="en-US" smtClean="0"/>
-              <a:t>7/25/2025</a:t>
+              <a:t>8/1/2025</a:t>
             </a:fld>
             <a:endParaRPr lang="en-US"/>
           </a:p>
@@ -2377,7 +2702,7 @@
           <a:p>
             <a:fld id="{BD2A41D9-64DF-42AE-8CA0-C087F888F636}" type="datetimeFigureOut">
               <a:rPr lang="en-US" smtClean="0"/>
-              <a:t>7/25/2025</a:t>
+              <a:t>8/1/2025</a:t>
             </a:fld>
             <a:endParaRPr lang="en-US"/>
           </a:p>
@@ -2665,7 +2990,7 @@
           <a:p>
             <a:fld id="{BD2A41D9-64DF-42AE-8CA0-C087F888F636}" type="datetimeFigureOut">
               <a:rPr lang="en-US" smtClean="0"/>
-              <a:t>7/25/2025</a:t>
+              <a:t>8/1/2025</a:t>
             </a:fld>
             <a:endParaRPr lang="en-US"/>
           </a:p>
@@ -2906,7 +3231,7 @@
           <a:p>
             <a:fld id="{BD2A41D9-64DF-42AE-8CA0-C087F888F636}" type="datetimeFigureOut">
               <a:rPr lang="en-US" smtClean="0"/>
-              <a:t>7/25/2025</a:t>
+              <a:t>8/1/2025</a:t>
             </a:fld>
             <a:endParaRPr lang="en-US"/>
           </a:p>
@@ -3395,14 +3720,6 @@
 <file path=ppt/slides/slide2.xml><?xml version="1.0" encoding="utf-8"?>
 <p:sld xmlns:a="http://schemas.openxmlformats.org/drawingml/2006/main" xmlns:r="http://schemas.openxmlformats.org/officeDocument/2006/relationships" xmlns:p="http://schemas.openxmlformats.org/presentationml/2006/main">
   <p:cSld>
-    <p:bg>
-      <p:bgPr>
-        <a:solidFill>
-          <a:schemeClr val="bg1"/>
-        </a:solidFill>
-        <a:effectLst/>
-      </p:bgPr>
-    </p:bg>
     <p:spTree>
       <p:nvGrpSpPr>
         <p:cNvPr id="1" name=""/>
@@ -3419,603 +3736,80 @@
       </p:grpSpPr>
       <p:sp>
         <p:nvSpPr>
-          <p:cNvPr id="10" name="Rectangle 9">
-            <a:extLst>
-              <a:ext uri="{FF2B5EF4-FFF2-40B4-BE49-F238E27FC236}">
-                <a16:creationId xmlns:a16="http://schemas.microsoft.com/office/drawing/2014/main" id="{353CF00F-82D0-0DBA-75D5-1D01B4526C68}"/>
-              </a:ext>
-              <a:ext uri="{C183D7F6-B498-43B3-948B-1728B52AA6E4}">
-                <adec:decorative xmlns:adec="http://schemas.microsoft.com/office/drawing/2017/decorative" val="1"/>
-              </a:ext>
-            </a:extLst>
-          </p:cNvPr>
-          <p:cNvSpPr>
-            <a:spLocks noGrp="1" noRot="1" noChangeAspect="1" noMove="1" noResize="1" noEditPoints="1" noAdjustHandles="1" noChangeArrowheads="1" noChangeShapeType="1" noTextEdit="1"/>
-          </p:cNvSpPr>
-          <p:nvPr>
-            <p:extLst>
-              <p:ext uri="{386F3935-93C4-4BCD-93E2-E3B085C9AB24}">
-                <p16:designElem xmlns:p16="http://schemas.microsoft.com/office/powerpoint/2015/main" val="1"/>
-              </p:ext>
-            </p:extLst>
-          </p:nvPr>
-        </p:nvSpPr>
-        <p:spPr>
-          <a:xfrm>
-            <a:off x="0" y="0"/>
-            <a:ext cx="12192000" cy="6858000"/>
-          </a:xfrm>
-          <a:prstGeom prst="rect">
-            <a:avLst/>
-          </a:prstGeom>
-          <a:solidFill>
-            <a:schemeClr val="bg1"/>
-          </a:solidFill>
-          <a:ln w="12700" cap="flat" cmpd="sng" algn="ctr">
-            <a:noFill/>
-            <a:prstDash val="solid"/>
-            <a:miter lim="800000"/>
-          </a:ln>
-          <a:effectLst/>
-          <a:extLst>
-            <a:ext uri="{91240B29-F687-4F45-9708-019B960494DF}">
-              <a14:hiddenLine xmlns:a14="http://schemas.microsoft.com/office/drawing/2010/main" w="12700" cap="flat" cmpd="sng" algn="ctr">
-                <a:solidFill>
-                  <a:schemeClr val="accent1">
-                    <a:shade val="15000"/>
-                  </a:schemeClr>
-                </a:solidFill>
-                <a:prstDash val="solid"/>
-                <a:miter lim="800000"/>
-              </a14:hiddenLine>
-            </a:ext>
-          </a:extLst>
-        </p:spPr>
-        <p:style>
-          <a:lnRef idx="2">
-            <a:schemeClr val="accent1">
-              <a:shade val="15000"/>
-            </a:schemeClr>
-          </a:lnRef>
-          <a:fillRef idx="1">
-            <a:schemeClr val="accent1"/>
-          </a:fillRef>
-          <a:effectRef idx="0">
-            <a:schemeClr val="accent1"/>
-          </a:effectRef>
-          <a:fontRef idx="minor">
-            <a:schemeClr val="lt1"/>
-          </a:fontRef>
-        </p:style>
-        <p:txBody>
-          <a:bodyPr rtlCol="0" anchor="ctr"/>
+          <p:cNvPr id="2" name="Title 1">
+            <a:extLst>
+              <a:ext uri="{FF2B5EF4-FFF2-40B4-BE49-F238E27FC236}">
+                <a16:creationId xmlns:a16="http://schemas.microsoft.com/office/drawing/2014/main" id="{0C7D48AD-2CC6-48C7-E989-B29FF486C057}"/>
+              </a:ext>
+            </a:extLst>
+          </p:cNvPr>
+          <p:cNvSpPr>
+            <a:spLocks noGrp="1"/>
+          </p:cNvSpPr>
+          <p:nvPr>
+            <p:ph type="title"/>
+          </p:nvPr>
+        </p:nvSpPr>
+        <p:spPr/>
+        <p:txBody>
+          <a:bodyPr/>
           <a:lstStyle/>
           <a:p>
             <a:pPr algn="ctr"/>
-            <a:endParaRPr lang="en-US"/>
-          </a:p>
-        </p:txBody>
-      </p:sp>
-      <p:sp>
-        <p:nvSpPr>
-          <p:cNvPr id="2" name="Title 1">
-            <a:extLst>
-              <a:ext uri="{FF2B5EF4-FFF2-40B4-BE49-F238E27FC236}">
-                <a16:creationId xmlns:a16="http://schemas.microsoft.com/office/drawing/2014/main" id="{92B2F52B-4FBB-1179-BE6B-1144E0954EA9}"/>
-              </a:ext>
-            </a:extLst>
-          </p:cNvPr>
-          <p:cNvSpPr>
-            <a:spLocks noGrp="1"/>
-          </p:cNvSpPr>
-          <p:nvPr>
-            <p:ph type="title"/>
-          </p:nvPr>
-        </p:nvSpPr>
-        <p:spPr>
-          <a:xfrm>
-            <a:off x="612648" y="548640"/>
-            <a:ext cx="10945037" cy="1133856"/>
-          </a:xfrm>
-        </p:spPr>
-        <p:txBody>
-          <a:bodyPr anchor="t">
+            <a:r>
+              <a:rPr lang="en-US" dirty="0"/>
+              <a:t>Introduction</a:t>
+            </a:r>
+          </a:p>
+        </p:txBody>
+      </p:sp>
+      <p:sp>
+        <p:nvSpPr>
+          <p:cNvPr id="3" name="Content Placeholder 2">
+            <a:extLst>
+              <a:ext uri="{FF2B5EF4-FFF2-40B4-BE49-F238E27FC236}">
+                <a16:creationId xmlns:a16="http://schemas.microsoft.com/office/drawing/2014/main" id="{AA1C0C05-9DB1-8250-BD65-398B3EFC7280}"/>
+              </a:ext>
+            </a:extLst>
+          </p:cNvPr>
+          <p:cNvSpPr>
+            <a:spLocks noGrp="1"/>
+          </p:cNvSpPr>
+          <p:nvPr>
+            <p:ph idx="1"/>
+          </p:nvPr>
+        </p:nvSpPr>
+        <p:spPr/>
+        <p:txBody>
+          <a:bodyPr>
             <a:normAutofit/>
           </a:bodyPr>
           <a:lstStyle/>
           <a:p>
+            <a:pPr marL="0" indent="0">
+              <a:buNone/>
+            </a:pPr>
             <a:r>
               <a:rPr lang="en-US" dirty="0"/>
-              <a:t>Agenda</a:t>
-            </a:r>
-          </a:p>
-        </p:txBody>
-      </p:sp>
-      <p:graphicFrame>
-        <p:nvGraphicFramePr>
-          <p:cNvPr id="5" name="Content Placeholder 4">
-            <a:extLst>
-              <a:ext uri="{FF2B5EF4-FFF2-40B4-BE49-F238E27FC236}">
-                <a16:creationId xmlns:a16="http://schemas.microsoft.com/office/drawing/2014/main" id="{59CFD983-3826-24AF-9DBF-57D9DF83DF37}"/>
-              </a:ext>
-            </a:extLst>
-          </p:cNvPr>
-          <p:cNvGraphicFramePr>
-            <a:graphicFrameLocks noGrp="1"/>
-          </p:cNvGraphicFramePr>
-          <p:nvPr>
-            <p:ph idx="1"/>
-            <p:extLst>
-              <p:ext uri="{D42A27DB-BD31-4B8C-83A1-F6EECF244321}">
-                <p14:modId xmlns:p14="http://schemas.microsoft.com/office/powerpoint/2010/main" val="498932748"/>
-              </p:ext>
-              <p:ext uri="{E7BDC344-281C-4309-B0C6-D0EE65EED2A8}">
-                <p202:designPr xmlns:p202="http://schemas.microsoft.com/office/powerpoint/2020/02/main">
-                  <p202:designTagLst>
-                    <p202:designTag name="ARCH:1:CLS" val="StackedSequentialRowTable"/>
-                  </p202:designTagLst>
-                </p202:designPr>
-              </p:ext>
-            </p:extLst>
-          </p:nvPr>
-        </p:nvGraphicFramePr>
-        <p:xfrm>
-          <a:off x="1092917" y="2029399"/>
-          <a:ext cx="9984501" cy="4117660"/>
-        </p:xfrm>
-        <a:graphic>
-          <a:graphicData uri="http://schemas.openxmlformats.org/drawingml/2006/table">
-            <a:tbl>
-              <a:tblPr firstRow="1" bandRow="1">
-                <a:noFill/>
-                <a:tableStyleId>{5C22544A-7EE6-4342-B048-85BDC9FD1C3A}</a:tableStyleId>
-              </a:tblPr>
-              <a:tblGrid>
-                <a:gridCol w="2254698">
-                  <a:extLst>
-                    <a:ext uri="{9D8B030D-6E8A-4147-A177-3AD203B41FA5}">
-                      <a16:colId xmlns:a16="http://schemas.microsoft.com/office/drawing/2014/main" val="2815167761"/>
-                    </a:ext>
-                  </a:extLst>
-                </a:gridCol>
-                <a:gridCol w="7729803">
-                  <a:extLst>
-                    <a:ext uri="{9D8B030D-6E8A-4147-A177-3AD203B41FA5}">
-                      <a16:colId xmlns:a16="http://schemas.microsoft.com/office/drawing/2014/main" val="2186538351"/>
-                    </a:ext>
-                  </a:extLst>
-                </a:gridCol>
-              </a:tblGrid>
-              <a:tr h="823532">
-                <a:tc>
-                  <a:txBody>
-                    <a:bodyPr/>
-                    <a:lstStyle/>
-                    <a:p>
-                      <a:r>
-                        <a:rPr lang="en-US" sz="3300" b="1" cap="none" spc="0">
-                          <a:solidFill>
-                            <a:schemeClr val="accent1"/>
-                          </a:solidFill>
-                        </a:rPr>
-                        <a:t>01</a:t>
-                      </a:r>
-                    </a:p>
-                  </a:txBody>
-                  <a:tcPr marL="141446" marR="141446" marT="141446" marB="141446" anchor="ctr">
-                    <a:lnL w="12700" cmpd="sng">
-                      <a:noFill/>
-                      <a:prstDash val="solid"/>
-                    </a:lnL>
-                    <a:lnR w="12700" cmpd="sng">
-                      <a:noFill/>
-                      <a:prstDash val="solid"/>
-                    </a:lnR>
-                    <a:lnT w="6350" cap="flat" cmpd="sng" algn="ctr">
-                      <a:noFill/>
-                      <a:prstDash val="solid"/>
-                    </a:lnT>
-                    <a:lnB w="6350" cap="flat" cmpd="sng" algn="ctr">
-                      <a:solidFill>
-                        <a:schemeClr val="tx1"/>
-                      </a:solidFill>
-                      <a:prstDash val="solid"/>
-                    </a:lnB>
-                    <a:noFill/>
-                  </a:tcPr>
-                </a:tc>
-                <a:tc>
-                  <a:txBody>
-                    <a:bodyPr/>
-                    <a:lstStyle/>
-                    <a:p>
-                      <a:pPr algn="l"/>
-                      <a:r>
-                        <a:rPr lang="en-US" sz="2100" b="0" cap="none" spc="0" dirty="0">
-                          <a:solidFill>
-                            <a:schemeClr val="tx1"/>
-                          </a:solidFill>
-                        </a:rPr>
-                        <a:t>Data imports and exploration</a:t>
-                      </a:r>
-                    </a:p>
-                  </a:txBody>
-                  <a:tcPr marL="141446" marR="141446" marT="141446" marB="141446" anchor="ctr">
-                    <a:lnL w="12700" cmpd="sng">
-                      <a:noFill/>
-                      <a:prstDash val="solid"/>
-                    </a:lnL>
-                    <a:lnR w="12700" cmpd="sng">
-                      <a:noFill/>
-                      <a:prstDash val="solid"/>
-                    </a:lnR>
-                    <a:lnT w="6350" cap="flat" cmpd="sng" algn="ctr">
-                      <a:noFill/>
-                      <a:prstDash val="solid"/>
-                    </a:lnT>
-                    <a:lnB w="6350" cap="flat" cmpd="sng" algn="ctr">
-                      <a:solidFill>
-                        <a:schemeClr val="tx1"/>
-                      </a:solidFill>
-                      <a:prstDash val="solid"/>
-                    </a:lnB>
-                    <a:noFill/>
-                  </a:tcPr>
-                </a:tc>
-                <a:extLst>
-                  <a:ext uri="{0D108BD9-81ED-4DB2-BD59-A6C34878D82A}">
-                    <a16:rowId xmlns:a16="http://schemas.microsoft.com/office/drawing/2014/main" val="1051976793"/>
-                  </a:ext>
-                </a:extLst>
-              </a:tr>
-              <a:tr h="823532">
-                <a:tc>
-                  <a:txBody>
-                    <a:bodyPr/>
-                    <a:lstStyle/>
-                    <a:p>
-                      <a:r>
-                        <a:rPr lang="en-US" sz="3300" b="1" cap="none" spc="0">
-                          <a:solidFill>
-                            <a:schemeClr val="accent1"/>
-                          </a:solidFill>
-                        </a:rPr>
-                        <a:t>02</a:t>
-                      </a:r>
-                    </a:p>
-                  </a:txBody>
-                  <a:tcPr marL="141446" marR="141446" marT="141446" marB="141446" anchor="ctr">
-                    <a:lnL w="12700" cmpd="sng">
-                      <a:noFill/>
-                      <a:prstDash val="solid"/>
-                    </a:lnL>
-                    <a:lnR w="12700" cmpd="sng">
-                      <a:noFill/>
-                      <a:prstDash val="solid"/>
-                    </a:lnR>
-                    <a:lnT w="6350" cap="flat" cmpd="sng" algn="ctr">
-                      <a:solidFill>
-                        <a:schemeClr val="tx1"/>
-                      </a:solidFill>
-                      <a:prstDash val="solid"/>
-                    </a:lnT>
-                    <a:lnB w="6350" cap="flat" cmpd="sng" algn="ctr">
-                      <a:solidFill>
-                        <a:schemeClr val="tx1"/>
-                      </a:solidFill>
-                      <a:prstDash val="solid"/>
-                    </a:lnB>
-                    <a:noFill/>
-                  </a:tcPr>
-                </a:tc>
-                <a:tc>
-                  <a:txBody>
-                    <a:bodyPr/>
-                    <a:lstStyle/>
-                    <a:p>
-                      <a:pPr algn="l"/>
-                      <a:r>
-                        <a:rPr lang="en-US" sz="2100" b="0" cap="none" spc="0" dirty="0">
-                          <a:solidFill>
-                            <a:schemeClr val="tx1"/>
-                          </a:solidFill>
-                        </a:rPr>
-                        <a:t>Exploratory Data analysis</a:t>
-                      </a:r>
-                    </a:p>
-                  </a:txBody>
-                  <a:tcPr marL="141446" marR="141446" marT="141446" marB="141446" anchor="ctr">
-                    <a:lnL w="12700" cmpd="sng">
-                      <a:noFill/>
-                      <a:prstDash val="solid"/>
-                    </a:lnL>
-                    <a:lnR w="12700" cmpd="sng">
-                      <a:noFill/>
-                      <a:prstDash val="solid"/>
-                    </a:lnR>
-                    <a:lnT w="6350" cap="flat" cmpd="sng" algn="ctr">
-                      <a:solidFill>
-                        <a:schemeClr val="tx1"/>
-                      </a:solidFill>
-                      <a:prstDash val="solid"/>
-                    </a:lnT>
-                    <a:lnB w="6350" cap="flat" cmpd="sng" algn="ctr">
-                      <a:solidFill>
-                        <a:schemeClr val="tx1"/>
-                      </a:solidFill>
-                      <a:prstDash val="solid"/>
-                    </a:lnB>
-                    <a:noFill/>
-                  </a:tcPr>
-                </a:tc>
-                <a:extLst>
-                  <a:ext uri="{0D108BD9-81ED-4DB2-BD59-A6C34878D82A}">
-                    <a16:rowId xmlns:a16="http://schemas.microsoft.com/office/drawing/2014/main" val="645041658"/>
-                  </a:ext>
-                </a:extLst>
-              </a:tr>
-              <a:tr h="823532">
-                <a:tc>
-                  <a:txBody>
-                    <a:bodyPr/>
-                    <a:lstStyle/>
-                    <a:p>
-                      <a:r>
-                        <a:rPr lang="en-US" sz="3300" b="1" cap="none" spc="0">
-                          <a:solidFill>
-                            <a:schemeClr val="accent1"/>
-                          </a:solidFill>
-                        </a:rPr>
-                        <a:t>03</a:t>
-                      </a:r>
-                    </a:p>
-                  </a:txBody>
-                  <a:tcPr marL="141446" marR="141446" marT="141446" marB="141446" anchor="ctr">
-                    <a:lnL w="12700" cmpd="sng">
-                      <a:noFill/>
-                      <a:prstDash val="solid"/>
-                    </a:lnL>
-                    <a:lnR w="12700" cmpd="sng">
-                      <a:noFill/>
-                      <a:prstDash val="solid"/>
-                    </a:lnR>
-                    <a:lnT w="6350" cap="flat" cmpd="sng" algn="ctr">
-                      <a:solidFill>
-                        <a:schemeClr val="tx1"/>
-                      </a:solidFill>
-                      <a:prstDash val="solid"/>
-                    </a:lnT>
-                    <a:lnB w="6350" cap="flat" cmpd="sng" algn="ctr">
-                      <a:solidFill>
-                        <a:schemeClr val="tx1"/>
-                      </a:solidFill>
-                      <a:prstDash val="solid"/>
-                    </a:lnB>
-                    <a:noFill/>
-                  </a:tcPr>
-                </a:tc>
-                <a:tc>
-                  <a:txBody>
-                    <a:bodyPr/>
-                    <a:lstStyle/>
-                    <a:p>
-                      <a:pPr algn="l"/>
-                      <a:r>
-                        <a:rPr lang="en-US" sz="2100" b="0" cap="none" spc="0" dirty="0">
-                          <a:solidFill>
-                            <a:schemeClr val="tx1"/>
-                          </a:solidFill>
-                        </a:rPr>
-                        <a:t>Feature selection and splitting</a:t>
-                      </a:r>
-                    </a:p>
-                  </a:txBody>
-                  <a:tcPr marL="141446" marR="141446" marT="141446" marB="141446" anchor="ctr">
-                    <a:lnL w="12700" cmpd="sng">
-                      <a:noFill/>
-                      <a:prstDash val="solid"/>
-                    </a:lnL>
-                    <a:lnR w="12700" cmpd="sng">
-                      <a:noFill/>
-                      <a:prstDash val="solid"/>
-                    </a:lnR>
-                    <a:lnT w="6350" cap="flat" cmpd="sng" algn="ctr">
-                      <a:solidFill>
-                        <a:schemeClr val="tx1"/>
-                      </a:solidFill>
-                      <a:prstDash val="solid"/>
-                    </a:lnT>
-                    <a:lnB w="6350" cap="flat" cmpd="sng" algn="ctr">
-                      <a:solidFill>
-                        <a:schemeClr val="tx1"/>
-                      </a:solidFill>
-                      <a:prstDash val="solid"/>
-                    </a:lnB>
-                    <a:noFill/>
-                  </a:tcPr>
-                </a:tc>
-                <a:extLst>
-                  <a:ext uri="{0D108BD9-81ED-4DB2-BD59-A6C34878D82A}">
-                    <a16:rowId xmlns:a16="http://schemas.microsoft.com/office/drawing/2014/main" val="1154097871"/>
-                  </a:ext>
-                </a:extLst>
-              </a:tr>
-              <a:tr h="823532">
-                <a:tc>
-                  <a:txBody>
-                    <a:bodyPr/>
-                    <a:lstStyle/>
-                    <a:p>
-                      <a:r>
-                        <a:rPr lang="en-US" sz="3300" b="1" cap="none" spc="0">
-                          <a:solidFill>
-                            <a:schemeClr val="accent1"/>
-                          </a:solidFill>
-                        </a:rPr>
-                        <a:t>04</a:t>
-                      </a:r>
-                    </a:p>
-                  </a:txBody>
-                  <a:tcPr marL="141446" marR="141446" marT="141446" marB="141446" anchor="ctr">
-                    <a:lnL w="12700" cmpd="sng">
-                      <a:noFill/>
-                      <a:prstDash val="solid"/>
-                    </a:lnL>
-                    <a:lnR w="12700" cmpd="sng">
-                      <a:noFill/>
-                      <a:prstDash val="solid"/>
-                    </a:lnR>
-                    <a:lnT w="6350" cap="flat" cmpd="sng" algn="ctr">
-                      <a:solidFill>
-                        <a:schemeClr val="tx1"/>
-                      </a:solidFill>
-                      <a:prstDash val="solid"/>
-                    </a:lnT>
-                    <a:lnB w="6350" cap="flat" cmpd="sng" algn="ctr">
-                      <a:solidFill>
-                        <a:schemeClr val="tx1"/>
-                      </a:solidFill>
-                      <a:prstDash val="solid"/>
-                    </a:lnB>
-                    <a:noFill/>
-                  </a:tcPr>
-                </a:tc>
-                <a:tc>
-                  <a:txBody>
-                    <a:bodyPr/>
-                    <a:lstStyle/>
-                    <a:p>
-                      <a:pPr algn="l"/>
-                      <a:r>
-                        <a:rPr lang="en-US" sz="2100" b="0" cap="none" spc="0" dirty="0">
-                          <a:solidFill>
-                            <a:schemeClr val="tx1"/>
-                          </a:solidFill>
-                        </a:rPr>
-                        <a:t>Model training</a:t>
-                      </a:r>
-                    </a:p>
-                  </a:txBody>
-                  <a:tcPr marL="141446" marR="141446" marT="141446" marB="141446" anchor="ctr">
-                    <a:lnL w="12700" cmpd="sng">
-                      <a:noFill/>
-                      <a:prstDash val="solid"/>
-                    </a:lnL>
-                    <a:lnR w="12700" cmpd="sng">
-                      <a:noFill/>
-                      <a:prstDash val="solid"/>
-                    </a:lnR>
-                    <a:lnT w="6350" cap="flat" cmpd="sng" algn="ctr">
-                      <a:solidFill>
-                        <a:schemeClr val="tx1"/>
-                      </a:solidFill>
-                      <a:prstDash val="solid"/>
-                    </a:lnT>
-                    <a:lnB w="6350" cap="flat" cmpd="sng" algn="ctr">
-                      <a:solidFill>
-                        <a:schemeClr val="tx1"/>
-                      </a:solidFill>
-                      <a:prstDash val="solid"/>
-                    </a:lnB>
-                    <a:noFill/>
-                  </a:tcPr>
-                </a:tc>
-                <a:extLst>
-                  <a:ext uri="{0D108BD9-81ED-4DB2-BD59-A6C34878D82A}">
-                    <a16:rowId xmlns:a16="http://schemas.microsoft.com/office/drawing/2014/main" val="1735493912"/>
-                  </a:ext>
-                </a:extLst>
-              </a:tr>
-              <a:tr h="823532">
-                <a:tc>
-                  <a:txBody>
-                    <a:bodyPr/>
-                    <a:lstStyle/>
-                    <a:p>
-                      <a:r>
-                        <a:rPr lang="en-US" sz="3300" b="1" cap="none" spc="0">
-                          <a:solidFill>
-                            <a:schemeClr val="accent1"/>
-                          </a:solidFill>
-                        </a:rPr>
-                        <a:t>05</a:t>
-                      </a:r>
-                    </a:p>
-                  </a:txBody>
-                  <a:tcPr marL="141446" marR="141446" marT="141446" marB="141446" anchor="ctr">
-                    <a:lnL w="12700" cmpd="sng">
-                      <a:noFill/>
-                      <a:prstDash val="solid"/>
-                    </a:lnL>
-                    <a:lnR w="12700" cmpd="sng">
-                      <a:noFill/>
-                      <a:prstDash val="solid"/>
-                    </a:lnR>
-                    <a:lnT w="6350" cap="flat" cmpd="sng" algn="ctr">
-                      <a:solidFill>
-                        <a:schemeClr val="tx1"/>
-                      </a:solidFill>
-                      <a:prstDash val="solid"/>
-                    </a:lnT>
-                    <a:lnB w="6350" cap="flat" cmpd="sng" algn="ctr">
-                      <a:noFill/>
-                      <a:prstDash val="solid"/>
-                    </a:lnB>
-                    <a:noFill/>
-                  </a:tcPr>
-                </a:tc>
-                <a:tc>
-                  <a:txBody>
-                    <a:bodyPr/>
-                    <a:lstStyle/>
-                    <a:p>
-                      <a:pPr algn="l"/>
-                      <a:r>
-                        <a:rPr lang="en-US" sz="2100" b="0" cap="none" spc="0" dirty="0">
-                          <a:solidFill>
-                            <a:schemeClr val="tx1"/>
-                          </a:solidFill>
-                        </a:rPr>
-                        <a:t>Evaluation</a:t>
-                      </a:r>
-                    </a:p>
-                  </a:txBody>
-                  <a:tcPr marL="141446" marR="141446" marT="141446" marB="141446" anchor="ctr">
-                    <a:lnL w="12700" cmpd="sng">
-                      <a:noFill/>
-                      <a:prstDash val="solid"/>
-                    </a:lnL>
-                    <a:lnR w="12700" cmpd="sng">
-                      <a:noFill/>
-                      <a:prstDash val="solid"/>
-                    </a:lnR>
-                    <a:lnT w="6350" cap="flat" cmpd="sng" algn="ctr">
-                      <a:solidFill>
-                        <a:schemeClr val="tx1"/>
-                      </a:solidFill>
-                      <a:prstDash val="solid"/>
-                    </a:lnT>
-                    <a:lnB w="6350" cap="flat" cmpd="sng" algn="ctr">
-                      <a:noFill/>
-                      <a:prstDash val="solid"/>
-                    </a:lnB>
-                    <a:noFill/>
-                  </a:tcPr>
-                </a:tc>
-                <a:extLst>
-                  <a:ext uri="{0D108BD9-81ED-4DB2-BD59-A6C34878D82A}">
-                    <a16:rowId xmlns:a16="http://schemas.microsoft.com/office/drawing/2014/main" val="4252254407"/>
-                  </a:ext>
-                </a:extLst>
-              </a:tr>
-            </a:tbl>
-          </a:graphicData>
-        </a:graphic>
-      </p:graphicFrame>
+              <a:t>Congratulations! You just got some contract work with an Ecommerce company based in New York City that sells clothing online, but they also have in-store style and clothing advice sessions. Customers come into the store, have sessions/meetings with a personal stylist, then they can go home and order either on a mobile app or website for the clothes they want.</a:t>
+            </a:r>
+            <a:br>
+              <a:rPr lang="en-US" dirty="0"/>
+            </a:br>
+            <a:r>
+              <a:rPr lang="en-US" dirty="0"/>
+              <a:t>The company is trying to decide whether to focus their efforts on their mobile app experience or their website. They've hired me on contract to help them figure it out! Let's get started!</a:t>
+            </a:r>
+          </a:p>
+          <a:p>
+            <a:endParaRPr lang="en-US" dirty="0"/>
+          </a:p>
+        </p:txBody>
+      </p:sp>
     </p:spTree>
     <p:extLst>
       <p:ext uri="{BB962C8B-B14F-4D97-AF65-F5344CB8AC3E}">
-        <p14:creationId xmlns:p14="http://schemas.microsoft.com/office/powerpoint/2010/main" val="1281965531"/>
+        <p14:creationId xmlns:p14="http://schemas.microsoft.com/office/powerpoint/2010/main" val="1469113360"/>
       </p:ext>
     </p:extLst>
   </p:cSld>
@@ -4852,6 +4646,1101 @@
     <p:extLst>
       <p:ext uri="{BB962C8B-B14F-4D97-AF65-F5344CB8AC3E}">
         <p14:creationId xmlns:p14="http://schemas.microsoft.com/office/powerpoint/2010/main" val="867246998"/>
+      </p:ext>
+    </p:extLst>
+  </p:cSld>
+  <p:clrMapOvr>
+    <a:masterClrMapping/>
+  </p:clrMapOvr>
+</p:sld>
+</file>
+
+<file path=ppt/slides/slide4.xml><?xml version="1.0" encoding="utf-8"?>
+<p:sld xmlns:a="http://schemas.openxmlformats.org/drawingml/2006/main" xmlns:r="http://schemas.openxmlformats.org/officeDocument/2006/relationships" xmlns:p="http://schemas.openxmlformats.org/presentationml/2006/main">
+  <p:cSld>
+    <p:bg>
+      <p:bgPr>
+        <a:solidFill>
+          <a:schemeClr val="bg1"/>
+        </a:solidFill>
+        <a:effectLst/>
+      </p:bgPr>
+    </p:bg>
+    <p:spTree>
+      <p:nvGrpSpPr>
+        <p:cNvPr id="1" name=""/>
+        <p:cNvGrpSpPr/>
+        <p:nvPr/>
+      </p:nvGrpSpPr>
+      <p:grpSpPr>
+        <a:xfrm>
+          <a:off x="0" y="0"/>
+          <a:ext cx="0" cy="0"/>
+          <a:chOff x="0" y="0"/>
+          <a:chExt cx="0" cy="0"/>
+        </a:xfrm>
+      </p:grpSpPr>
+      <p:sp>
+        <p:nvSpPr>
+          <p:cNvPr id="2" name="Title 1">
+            <a:extLst>
+              <a:ext uri="{FF2B5EF4-FFF2-40B4-BE49-F238E27FC236}">
+                <a16:creationId xmlns:a16="http://schemas.microsoft.com/office/drawing/2014/main" id="{3FF9D074-5D3A-4E8C-DC7B-7826EA19D439}"/>
+              </a:ext>
+            </a:extLst>
+          </p:cNvPr>
+          <p:cNvSpPr>
+            <a:spLocks noGrp="1"/>
+          </p:cNvSpPr>
+          <p:nvPr>
+            <p:ph type="title"/>
+          </p:nvPr>
+        </p:nvSpPr>
+        <p:spPr>
+          <a:xfrm>
+            <a:off x="876693" y="741391"/>
+            <a:ext cx="3351679" cy="1616203"/>
+          </a:xfrm>
+        </p:spPr>
+        <p:txBody>
+          <a:bodyPr vert="horz" lIns="91440" tIns="45720" rIns="91440" bIns="45720" rtlCol="0" anchor="b">
+            <a:normAutofit/>
+          </a:bodyPr>
+          <a:lstStyle/>
+          <a:p>
+            <a:r>
+              <a:rPr lang="en-US" kern="1200">
+                <a:solidFill>
+                  <a:schemeClr val="tx1"/>
+                </a:solidFill>
+                <a:latin typeface="+mj-lt"/>
+                <a:ea typeface="+mj-ea"/>
+                <a:cs typeface="+mj-cs"/>
+              </a:rPr>
+              <a:t>Exploring the data and visualization </a:t>
+            </a:r>
+          </a:p>
+        </p:txBody>
+      </p:sp>
+      <p:sp>
+        <p:nvSpPr>
+          <p:cNvPr id="4" name="Text Placeholder 3">
+            <a:extLst>
+              <a:ext uri="{FF2B5EF4-FFF2-40B4-BE49-F238E27FC236}">
+                <a16:creationId xmlns:a16="http://schemas.microsoft.com/office/drawing/2014/main" id="{E9CFC8D2-0D3C-2624-7230-A921B8958B33}"/>
+              </a:ext>
+            </a:extLst>
+          </p:cNvPr>
+          <p:cNvSpPr>
+            <a:spLocks noGrp="1"/>
+          </p:cNvSpPr>
+          <p:nvPr>
+            <p:ph type="body" sz="half" idx="2"/>
+          </p:nvPr>
+        </p:nvSpPr>
+        <p:spPr>
+          <a:xfrm>
+            <a:off x="876693" y="2533476"/>
+            <a:ext cx="3351679" cy="3447832"/>
+          </a:xfrm>
+        </p:spPr>
+        <p:txBody>
+          <a:bodyPr vert="horz" lIns="91440" tIns="45720" rIns="91440" bIns="45720" rtlCol="0" anchor="t">
+            <a:normAutofit fontScale="92500" lnSpcReduction="20000"/>
+          </a:bodyPr>
+          <a:lstStyle/>
+          <a:p>
+            <a:pPr marL="285750" indent="-228600">
+              <a:buFont typeface="Arial" panose="020B0604020202020204" pitchFamily="34" charset="0"/>
+              <a:buChar char="•"/>
+            </a:pPr>
+            <a:r>
+              <a:rPr lang="en-US" sz="2000" dirty="0"/>
+              <a:t>Used the describe and info to get a little more information about the dataset.</a:t>
+            </a:r>
+          </a:p>
+          <a:p>
+            <a:pPr marL="285750" indent="-228600">
+              <a:buFont typeface="Arial" panose="020B0604020202020204" pitchFamily="34" charset="0"/>
+              <a:buChar char="•"/>
+            </a:pPr>
+            <a:endParaRPr lang="en-US" sz="2000" dirty="0"/>
+          </a:p>
+          <a:p>
+            <a:pPr marL="285750" indent="-228600">
+              <a:buFont typeface="Arial" panose="020B0604020202020204" pitchFamily="34" charset="0"/>
+              <a:buChar char="•"/>
+            </a:pPr>
+            <a:r>
+              <a:rPr lang="en-US" sz="2000" dirty="0"/>
+              <a:t>Used Seaborn to create a joint plot between the time spent on the Website and Yearly amount spent.</a:t>
+            </a:r>
+          </a:p>
+          <a:p>
+            <a:pPr marL="285750" indent="-228600">
+              <a:buFont typeface="Arial" panose="020B0604020202020204" pitchFamily="34" charset="0"/>
+              <a:buChar char="•"/>
+            </a:pPr>
+            <a:r>
+              <a:rPr lang="en-US" sz="2000" dirty="0"/>
+              <a:t>Also used seaborn to create a linear plot between the Length of membership and the Yearly amount spent</a:t>
+            </a:r>
+          </a:p>
+        </p:txBody>
+      </p:sp>
+      <p:pic>
+        <p:nvPicPr>
+          <p:cNvPr id="8" name="Picture 7">
+            <a:extLst>
+              <a:ext uri="{FF2B5EF4-FFF2-40B4-BE49-F238E27FC236}">
+                <a16:creationId xmlns:a16="http://schemas.microsoft.com/office/drawing/2014/main" id="{00733B3A-7037-66A5-544E-BB365D175360}"/>
+              </a:ext>
+            </a:extLst>
+          </p:cNvPr>
+          <p:cNvPicPr>
+            <a:picLocks noChangeAspect="1"/>
+          </p:cNvPicPr>
+          <p:nvPr/>
+        </p:nvPicPr>
+        <p:blipFill>
+          <a:blip r:embed="rId2"/>
+          <a:srcRect t="12134" b="8550"/>
+          <a:stretch>
+            <a:fillRect/>
+          </a:stretch>
+        </p:blipFill>
+        <p:spPr>
+          <a:xfrm>
+            <a:off x="5065566" y="10"/>
+            <a:ext cx="7032825" cy="4378805"/>
+          </a:xfrm>
+          <a:prstGeom prst="rect">
+            <a:avLst/>
+          </a:prstGeom>
+        </p:spPr>
+      </p:pic>
+      <p:sp>
+        <p:nvSpPr>
+          <p:cNvPr id="20" name="Rectangle 19">
+            <a:extLst>
+              <a:ext uri="{FF2B5EF4-FFF2-40B4-BE49-F238E27FC236}">
+                <a16:creationId xmlns:a16="http://schemas.microsoft.com/office/drawing/2014/main" id="{4DD35268-6FBE-0BCD-C050-3F804C7C54A2}"/>
+              </a:ext>
+              <a:ext uri="{C183D7F6-B498-43B3-948B-1728B52AA6E4}">
+                <adec:decorative xmlns:adec="http://schemas.microsoft.com/office/drawing/2017/decorative" val="1"/>
+              </a:ext>
+            </a:extLst>
+          </p:cNvPr>
+          <p:cNvSpPr>
+            <a:spLocks noGrp="1" noRot="1" noChangeAspect="1" noMove="1" noResize="1" noEditPoints="1" noAdjustHandles="1" noChangeArrowheads="1" noChangeShapeType="1" noTextEdit="1"/>
+          </p:cNvSpPr>
+          <p:nvPr>
+            <p:extLst>
+              <p:ext uri="{386F3935-93C4-4BCD-93E2-E3B085C9AB24}">
+                <p16:designElem xmlns:p16="http://schemas.microsoft.com/office/powerpoint/2015/main" val="1"/>
+              </p:ext>
+            </p:extLst>
+          </p:nvPr>
+        </p:nvSpPr>
+        <p:spPr>
+          <a:xfrm rot="10800000">
+            <a:off x="12068597" y="0"/>
+            <a:ext cx="123401" cy="3290157"/>
+          </a:xfrm>
+          <a:prstGeom prst="rect">
+            <a:avLst/>
+          </a:prstGeom>
+          <a:gradFill>
+            <a:gsLst>
+              <a:gs pos="20000">
+                <a:schemeClr val="accent3">
+                  <a:alpha val="0"/>
+                </a:schemeClr>
+              </a:gs>
+              <a:gs pos="100000">
+                <a:schemeClr val="accent3">
+                  <a:lumMod val="60000"/>
+                  <a:lumOff val="40000"/>
+                </a:schemeClr>
+              </a:gs>
+            </a:gsLst>
+            <a:lin ang="1800000" scaled="0"/>
+          </a:gradFill>
+          <a:ln>
+            <a:noFill/>
+          </a:ln>
+        </p:spPr>
+        <p:style>
+          <a:lnRef idx="2">
+            <a:schemeClr val="accent1">
+              <a:shade val="50000"/>
+            </a:schemeClr>
+          </a:lnRef>
+          <a:fillRef idx="1">
+            <a:schemeClr val="accent1"/>
+          </a:fillRef>
+          <a:effectRef idx="0">
+            <a:schemeClr val="accent1"/>
+          </a:effectRef>
+          <a:fontRef idx="minor">
+            <a:schemeClr val="lt1"/>
+          </a:fontRef>
+        </p:style>
+        <p:txBody>
+          <a:bodyPr rtlCol="0" anchor="ctr"/>
+          <a:lstStyle/>
+          <a:p>
+            <a:pPr algn="ctr"/>
+            <a:endParaRPr lang="en-US"/>
+          </a:p>
+        </p:txBody>
+      </p:sp>
+      <p:pic>
+        <p:nvPicPr>
+          <p:cNvPr id="6" name="Content Placeholder 5">
+            <a:extLst>
+              <a:ext uri="{FF2B5EF4-FFF2-40B4-BE49-F238E27FC236}">
+                <a16:creationId xmlns:a16="http://schemas.microsoft.com/office/drawing/2014/main" id="{A989E515-E22D-A874-6FA2-7CA060120822}"/>
+              </a:ext>
+            </a:extLst>
+          </p:cNvPr>
+          <p:cNvPicPr>
+            <a:picLocks noGrp="1" noChangeAspect="1"/>
+          </p:cNvPicPr>
+          <p:nvPr>
+            <p:ph idx="1"/>
+          </p:nvPr>
+        </p:nvPicPr>
+        <p:blipFill>
+          <a:blip r:embed="rId3"/>
+          <a:srcRect r="2961" b="-3"/>
+          <a:stretch>
+            <a:fillRect/>
+          </a:stretch>
+        </p:blipFill>
+        <p:spPr>
+          <a:xfrm>
+            <a:off x="5065566" y="4378817"/>
+            <a:ext cx="3524828" cy="2479183"/>
+          </a:xfrm>
+          <a:prstGeom prst="rect">
+            <a:avLst/>
+          </a:prstGeom>
+        </p:spPr>
+      </p:pic>
+      <p:pic>
+        <p:nvPicPr>
+          <p:cNvPr id="10" name="Picture 9">
+            <a:extLst>
+              <a:ext uri="{FF2B5EF4-FFF2-40B4-BE49-F238E27FC236}">
+                <a16:creationId xmlns:a16="http://schemas.microsoft.com/office/drawing/2014/main" id="{AA1CAFCD-AEB9-C75C-883E-D1DC6B66E09E}"/>
+              </a:ext>
+            </a:extLst>
+          </p:cNvPr>
+          <p:cNvPicPr>
+            <a:picLocks noChangeAspect="1"/>
+          </p:cNvPicPr>
+          <p:nvPr/>
+        </p:nvPicPr>
+        <p:blipFill>
+          <a:blip r:embed="rId4"/>
+          <a:srcRect t="9537" r="-1" b="-1"/>
+          <a:stretch>
+            <a:fillRect/>
+          </a:stretch>
+        </p:blipFill>
+        <p:spPr>
+          <a:xfrm>
+            <a:off x="8573563" y="4378818"/>
+            <a:ext cx="3524828" cy="2479182"/>
+          </a:xfrm>
+          <a:prstGeom prst="rect">
+            <a:avLst/>
+          </a:prstGeom>
+        </p:spPr>
+      </p:pic>
+      <p:grpSp>
+        <p:nvGrpSpPr>
+          <p:cNvPr id="17" name="Group 16">
+            <a:extLst>
+              <a:ext uri="{FF2B5EF4-FFF2-40B4-BE49-F238E27FC236}">
+                <a16:creationId xmlns:a16="http://schemas.microsoft.com/office/drawing/2014/main" id="{F3A0B02E-2A29-A1CD-0D60-A9E1681AF3C7}"/>
+              </a:ext>
+              <a:ext uri="{C183D7F6-B498-43B3-948B-1728B52AA6E4}">
+                <adec:decorative xmlns:adec="http://schemas.microsoft.com/office/drawing/2017/decorative" val="1"/>
+              </a:ext>
+            </a:extLst>
+          </p:cNvPr>
+          <p:cNvGrpSpPr>
+            <a:grpSpLocks noGrp="1" noUngrp="1" noRot="1" noChangeAspect="1" noMove="1" noResize="1"/>
+          </p:cNvGrpSpPr>
+          <p:nvPr>
+            <p:extLst>
+              <p:ext uri="{386F3935-93C4-4BCD-93E2-E3B085C9AB24}">
+                <p16:designElem xmlns:p16="http://schemas.microsoft.com/office/powerpoint/2015/main" val="1"/>
+              </p:ext>
+            </p:extLst>
+          </p:nvPr>
+        </p:nvGrpSpPr>
+        <p:grpSpPr>
+          <a:xfrm>
+            <a:off x="12068638" y="0"/>
+            <a:ext cx="123362" cy="6858000"/>
+            <a:chOff x="12068638" y="0"/>
+            <a:chExt cx="123362" cy="6858000"/>
+          </a:xfrm>
+        </p:grpSpPr>
+        <p:sp>
+          <p:nvSpPr>
+            <p:cNvPr id="18" name="Rectangle 17">
+              <a:extLst>
+                <a:ext uri="{FF2B5EF4-FFF2-40B4-BE49-F238E27FC236}">
+                  <a16:creationId xmlns:a16="http://schemas.microsoft.com/office/drawing/2014/main" id="{DB760236-1E5E-7CEA-DCDD-21F3FB288AEC}"/>
+                </a:ext>
+                <a:ext uri="{C183D7F6-B498-43B3-948B-1728B52AA6E4}">
+                  <adec:decorative xmlns:adec="http://schemas.microsoft.com/office/drawing/2017/decorative" val="1"/>
+                </a:ext>
+              </a:extLst>
+            </p:cNvPr>
+            <p:cNvSpPr/>
+            <p:nvPr>
+              <p:extLst>
+                <p:ext uri="{386F3935-93C4-4BCD-93E2-E3B085C9AB24}">
+                  <p16:designElem xmlns:p16="http://schemas.microsoft.com/office/powerpoint/2015/main" val="1"/>
+                </p:ext>
+              </p:extLst>
+            </p:nvPr>
+          </p:nvSpPr>
+          <p:spPr>
+            <a:xfrm>
+              <a:off x="12068638" y="0"/>
+              <a:ext cx="123362" cy="6858000"/>
+            </a:xfrm>
+            <a:prstGeom prst="rect">
+              <a:avLst/>
+            </a:prstGeom>
+            <a:gradFill>
+              <a:gsLst>
+                <a:gs pos="0">
+                  <a:schemeClr val="accent2"/>
+                </a:gs>
+                <a:gs pos="100000">
+                  <a:schemeClr val="accent5"/>
+                </a:gs>
+              </a:gsLst>
+              <a:lin ang="1800000" scaled="0"/>
+            </a:gradFill>
+            <a:ln>
+              <a:noFill/>
+            </a:ln>
+          </p:spPr>
+          <p:style>
+            <a:lnRef idx="2">
+              <a:schemeClr val="accent1">
+                <a:shade val="50000"/>
+              </a:schemeClr>
+            </a:lnRef>
+            <a:fillRef idx="1">
+              <a:schemeClr val="accent1"/>
+            </a:fillRef>
+            <a:effectRef idx="0">
+              <a:schemeClr val="accent1"/>
+            </a:effectRef>
+            <a:fontRef idx="minor">
+              <a:schemeClr val="lt1"/>
+            </a:fontRef>
+          </p:style>
+          <p:txBody>
+            <a:bodyPr rtlCol="0" anchor="ctr"/>
+            <a:lstStyle/>
+            <a:p>
+              <a:pPr algn="ctr"/>
+              <a:endParaRPr lang="en-US"/>
+            </a:p>
+          </p:txBody>
+        </p:sp>
+        <p:sp>
+          <p:nvSpPr>
+            <p:cNvPr id="19" name="Rectangle 18">
+              <a:extLst>
+                <a:ext uri="{FF2B5EF4-FFF2-40B4-BE49-F238E27FC236}">
+                  <a16:creationId xmlns:a16="http://schemas.microsoft.com/office/drawing/2014/main" id="{30D6BAEE-FD58-F5B7-5CF3-A74EB385D75E}"/>
+                </a:ext>
+                <a:ext uri="{C183D7F6-B498-43B3-948B-1728B52AA6E4}">
+                  <adec:decorative xmlns:adec="http://schemas.microsoft.com/office/drawing/2017/decorative" val="1"/>
+                </a:ext>
+              </a:extLst>
+            </p:cNvPr>
+            <p:cNvSpPr/>
+            <p:nvPr>
+              <p:extLst>
+                <p:ext uri="{386F3935-93C4-4BCD-93E2-E3B085C9AB24}">
+                  <p16:designElem xmlns:p16="http://schemas.microsoft.com/office/powerpoint/2015/main" val="1"/>
+                </p:ext>
+              </p:extLst>
+            </p:nvPr>
+          </p:nvSpPr>
+          <p:spPr>
+            <a:xfrm>
+              <a:off x="12068638" y="3527553"/>
+              <a:ext cx="123362" cy="3330447"/>
+            </a:xfrm>
+            <a:prstGeom prst="rect">
+              <a:avLst/>
+            </a:prstGeom>
+            <a:gradFill>
+              <a:gsLst>
+                <a:gs pos="27000">
+                  <a:schemeClr val="accent5">
+                    <a:alpha val="0"/>
+                  </a:schemeClr>
+                </a:gs>
+                <a:gs pos="100000">
+                  <a:schemeClr val="accent5">
+                    <a:lumMod val="60000"/>
+                    <a:lumOff val="40000"/>
+                  </a:schemeClr>
+                </a:gs>
+              </a:gsLst>
+              <a:lin ang="600000" scaled="0"/>
+            </a:gradFill>
+            <a:ln>
+              <a:noFill/>
+            </a:ln>
+          </p:spPr>
+          <p:style>
+            <a:lnRef idx="2">
+              <a:schemeClr val="accent1">
+                <a:shade val="50000"/>
+              </a:schemeClr>
+            </a:lnRef>
+            <a:fillRef idx="1">
+              <a:schemeClr val="accent1"/>
+            </a:fillRef>
+            <a:effectRef idx="0">
+              <a:schemeClr val="accent1"/>
+            </a:effectRef>
+            <a:fontRef idx="minor">
+              <a:schemeClr val="lt1"/>
+            </a:fontRef>
+          </p:style>
+          <p:txBody>
+            <a:bodyPr rtlCol="0" anchor="ctr"/>
+            <a:lstStyle/>
+            <a:p>
+              <a:pPr algn="ctr"/>
+              <a:endParaRPr lang="en-US"/>
+            </a:p>
+          </p:txBody>
+        </p:sp>
+      </p:grpSp>
+    </p:spTree>
+    <p:extLst>
+      <p:ext uri="{BB962C8B-B14F-4D97-AF65-F5344CB8AC3E}">
+        <p14:creationId xmlns:p14="http://schemas.microsoft.com/office/powerpoint/2010/main" val="3784430539"/>
+      </p:ext>
+    </p:extLst>
+  </p:cSld>
+  <p:clrMapOvr>
+    <a:masterClrMapping/>
+  </p:clrMapOvr>
+</p:sld>
+</file>
+
+<file path=ppt/slides/slide5.xml><?xml version="1.0" encoding="utf-8"?>
+<p:sld xmlns:a="http://schemas.openxmlformats.org/drawingml/2006/main" xmlns:r="http://schemas.openxmlformats.org/officeDocument/2006/relationships" xmlns:p="http://schemas.openxmlformats.org/presentationml/2006/main">
+  <p:cSld>
+    <p:spTree>
+      <p:nvGrpSpPr>
+        <p:cNvPr id="1" name=""/>
+        <p:cNvGrpSpPr/>
+        <p:nvPr/>
+      </p:nvGrpSpPr>
+      <p:grpSpPr>
+        <a:xfrm>
+          <a:off x="0" y="0"/>
+          <a:ext cx="0" cy="0"/>
+          <a:chOff x="0" y="0"/>
+          <a:chExt cx="0" cy="0"/>
+        </a:xfrm>
+      </p:grpSpPr>
+      <p:sp>
+        <p:nvSpPr>
+          <p:cNvPr id="2" name="Title 1">
+            <a:extLst>
+              <a:ext uri="{FF2B5EF4-FFF2-40B4-BE49-F238E27FC236}">
+                <a16:creationId xmlns:a16="http://schemas.microsoft.com/office/drawing/2014/main" id="{FBEF5D87-74F0-B65F-5CB0-03D765349F64}"/>
+              </a:ext>
+            </a:extLst>
+          </p:cNvPr>
+          <p:cNvSpPr>
+            <a:spLocks noGrp="1"/>
+          </p:cNvSpPr>
+          <p:nvPr>
+            <p:ph type="title"/>
+          </p:nvPr>
+        </p:nvSpPr>
+        <p:spPr/>
+        <p:txBody>
+          <a:bodyPr/>
+          <a:lstStyle/>
+          <a:p>
+            <a:pPr algn="ctr"/>
+            <a:r>
+              <a:rPr lang="en-US" dirty="0"/>
+              <a:t>Setting Up my model for training</a:t>
+            </a:r>
+          </a:p>
+        </p:txBody>
+      </p:sp>
+      <p:pic>
+        <p:nvPicPr>
+          <p:cNvPr id="5" name="Content Placeholder 4">
+            <a:extLst>
+              <a:ext uri="{FF2B5EF4-FFF2-40B4-BE49-F238E27FC236}">
+                <a16:creationId xmlns:a16="http://schemas.microsoft.com/office/drawing/2014/main" id="{01030FAB-C9AA-C6F8-A963-C1142572BB49}"/>
+              </a:ext>
+            </a:extLst>
+          </p:cNvPr>
+          <p:cNvPicPr>
+            <a:picLocks noGrp="1" noChangeAspect="1"/>
+          </p:cNvPicPr>
+          <p:nvPr>
+            <p:ph idx="1"/>
+          </p:nvPr>
+        </p:nvPicPr>
+        <p:blipFill>
+          <a:blip r:embed="rId2"/>
+          <a:stretch>
+            <a:fillRect/>
+          </a:stretch>
+        </p:blipFill>
+        <p:spPr>
+          <a:xfrm>
+            <a:off x="1235222" y="1450787"/>
+            <a:ext cx="9721556" cy="4856804"/>
+          </a:xfrm>
+        </p:spPr>
+      </p:pic>
+    </p:spTree>
+    <p:extLst>
+      <p:ext uri="{BB962C8B-B14F-4D97-AF65-F5344CB8AC3E}">
+        <p14:creationId xmlns:p14="http://schemas.microsoft.com/office/powerpoint/2010/main" val="1701651803"/>
+      </p:ext>
+    </p:extLst>
+  </p:cSld>
+  <p:clrMapOvr>
+    <a:masterClrMapping/>
+  </p:clrMapOvr>
+</p:sld>
+</file>
+
+<file path=ppt/slides/slide6.xml><?xml version="1.0" encoding="utf-8"?>
+<p:sld xmlns:a="http://schemas.openxmlformats.org/drawingml/2006/main" xmlns:r="http://schemas.openxmlformats.org/officeDocument/2006/relationships" xmlns:p="http://schemas.openxmlformats.org/presentationml/2006/main">
+  <p:cSld>
+    <p:bg>
+      <p:bgPr>
+        <a:solidFill>
+          <a:schemeClr val="bg1"/>
+        </a:solidFill>
+        <a:effectLst/>
+      </p:bgPr>
+    </p:bg>
+    <p:spTree>
+      <p:nvGrpSpPr>
+        <p:cNvPr id="1" name=""/>
+        <p:cNvGrpSpPr/>
+        <p:nvPr/>
+      </p:nvGrpSpPr>
+      <p:grpSpPr>
+        <a:xfrm>
+          <a:off x="0" y="0"/>
+          <a:ext cx="0" cy="0"/>
+          <a:chOff x="0" y="0"/>
+          <a:chExt cx="0" cy="0"/>
+        </a:xfrm>
+      </p:grpSpPr>
+      <p:sp>
+        <p:nvSpPr>
+          <p:cNvPr id="10" name="Rectangle 9">
+            <a:extLst>
+              <a:ext uri="{FF2B5EF4-FFF2-40B4-BE49-F238E27FC236}">
+                <a16:creationId xmlns:a16="http://schemas.microsoft.com/office/drawing/2014/main" id="{6753252F-4873-4F63-801D-CC719279A7D5}"/>
+              </a:ext>
+              <a:ext uri="{C183D7F6-B498-43B3-948B-1728B52AA6E4}">
+                <adec:decorative xmlns:adec="http://schemas.microsoft.com/office/drawing/2017/decorative" val="1"/>
+              </a:ext>
+            </a:extLst>
+          </p:cNvPr>
+          <p:cNvSpPr>
+            <a:spLocks noGrp="1" noRot="1" noChangeAspect="1" noMove="1" noResize="1" noEditPoints="1" noAdjustHandles="1" noChangeArrowheads="1" noChangeShapeType="1" noTextEdit="1"/>
+          </p:cNvSpPr>
+          <p:nvPr>
+            <p:extLst>
+              <p:ext uri="{386F3935-93C4-4BCD-93E2-E3B085C9AB24}">
+                <p16:designElem xmlns:p16="http://schemas.microsoft.com/office/powerpoint/2015/main" val="1"/>
+              </p:ext>
+            </p:extLst>
+          </p:nvPr>
+        </p:nvSpPr>
+        <p:spPr>
+          <a:xfrm>
+            <a:off x="0" y="0"/>
+            <a:ext cx="12192000" cy="6858000"/>
+          </a:xfrm>
+          <a:prstGeom prst="rect">
+            <a:avLst/>
+          </a:prstGeom>
+          <a:solidFill>
+            <a:srgbClr val="FFFFFF"/>
+          </a:solidFill>
+          <a:ln>
+            <a:noFill/>
+          </a:ln>
+        </p:spPr>
+        <p:style>
+          <a:lnRef idx="2">
+            <a:schemeClr val="accent1">
+              <a:shade val="50000"/>
+            </a:schemeClr>
+          </a:lnRef>
+          <a:fillRef idx="1">
+            <a:schemeClr val="accent1"/>
+          </a:fillRef>
+          <a:effectRef idx="0">
+            <a:schemeClr val="accent1"/>
+          </a:effectRef>
+          <a:fontRef idx="minor">
+            <a:schemeClr val="lt1"/>
+          </a:fontRef>
+        </p:style>
+        <p:txBody>
+          <a:bodyPr rtlCol="0" anchor="ctr"/>
+          <a:lstStyle/>
+          <a:p>
+            <a:pPr algn="ctr"/>
+            <a:endParaRPr lang="en-US"/>
+          </a:p>
+        </p:txBody>
+      </p:sp>
+      <p:sp>
+        <p:nvSpPr>
+          <p:cNvPr id="12" name="Rectangle 11">
+            <a:extLst>
+              <a:ext uri="{FF2B5EF4-FFF2-40B4-BE49-F238E27FC236}">
+                <a16:creationId xmlns:a16="http://schemas.microsoft.com/office/drawing/2014/main" id="{047C8CCB-F95D-4249-92DD-651249D3535A}"/>
+              </a:ext>
+              <a:ext uri="{C183D7F6-B498-43B3-948B-1728B52AA6E4}">
+                <adec:decorative xmlns:adec="http://schemas.microsoft.com/office/drawing/2017/decorative" val="1"/>
+              </a:ext>
+            </a:extLst>
+          </p:cNvPr>
+          <p:cNvSpPr>
+            <a:spLocks noGrp="1" noRot="1" noChangeAspect="1" noMove="1" noResize="1" noEditPoints="1" noAdjustHandles="1" noChangeArrowheads="1" noChangeShapeType="1" noTextEdit="1"/>
+          </p:cNvSpPr>
+          <p:nvPr>
+            <p:extLst>
+              <p:ext uri="{386F3935-93C4-4BCD-93E2-E3B085C9AB24}">
+                <p16:designElem xmlns:p16="http://schemas.microsoft.com/office/powerpoint/2015/main" val="1"/>
+              </p:ext>
+            </p:extLst>
+          </p:nvPr>
+        </p:nvSpPr>
+        <p:spPr>
+          <a:xfrm>
+            <a:off x="0" y="0"/>
+            <a:ext cx="2013557" cy="6858000"/>
+          </a:xfrm>
+          <a:prstGeom prst="rect">
+            <a:avLst/>
+          </a:prstGeom>
+          <a:solidFill>
+            <a:srgbClr val="375340"/>
+          </a:solidFill>
+          <a:ln>
+            <a:noFill/>
+          </a:ln>
+        </p:spPr>
+        <p:style>
+          <a:lnRef idx="2">
+            <a:schemeClr val="accent1">
+              <a:shade val="50000"/>
+            </a:schemeClr>
+          </a:lnRef>
+          <a:fillRef idx="1">
+            <a:schemeClr val="accent1"/>
+          </a:fillRef>
+          <a:effectRef idx="0">
+            <a:schemeClr val="accent1"/>
+          </a:effectRef>
+          <a:fontRef idx="minor">
+            <a:schemeClr val="lt1"/>
+          </a:fontRef>
+        </p:style>
+        <p:txBody>
+          <a:bodyPr rtlCol="0" anchor="ctr"/>
+          <a:lstStyle/>
+          <a:p>
+            <a:pPr algn="ctr"/>
+            <a:endParaRPr lang="en-US"/>
+          </a:p>
+        </p:txBody>
+      </p:sp>
+      <p:sp>
+        <p:nvSpPr>
+          <p:cNvPr id="2" name="Title 1">
+            <a:extLst>
+              <a:ext uri="{FF2B5EF4-FFF2-40B4-BE49-F238E27FC236}">
+                <a16:creationId xmlns:a16="http://schemas.microsoft.com/office/drawing/2014/main" id="{7865DA95-FE2C-FBE2-4CB1-EC5270181F83}"/>
+              </a:ext>
+            </a:extLst>
+          </p:cNvPr>
+          <p:cNvSpPr>
+            <a:spLocks noGrp="1"/>
+          </p:cNvSpPr>
+          <p:nvPr>
+            <p:ph type="title"/>
+          </p:nvPr>
+        </p:nvSpPr>
+        <p:spPr>
+          <a:xfrm>
+            <a:off x="640080" y="2074363"/>
+            <a:ext cx="2752354" cy="2709275"/>
+          </a:xfrm>
+          <a:prstGeom prst="ellipse">
+            <a:avLst/>
+          </a:prstGeom>
+          <a:solidFill>
+            <a:srgbClr val="262626"/>
+          </a:solidFill>
+          <a:ln w="174625" cmpd="thinThick">
+            <a:solidFill>
+              <a:srgbClr val="262626"/>
+            </a:solidFill>
+          </a:ln>
+        </p:spPr>
+        <p:txBody>
+          <a:bodyPr vert="horz" lIns="91440" tIns="45720" rIns="91440" bIns="45720" rtlCol="0" anchor="ctr">
+            <a:normAutofit/>
+          </a:bodyPr>
+          <a:lstStyle/>
+          <a:p>
+            <a:pPr algn="ctr"/>
+            <a:r>
+              <a:rPr lang="en-US" sz="2600" kern="1200">
+                <a:solidFill>
+                  <a:srgbClr val="FFFFFF"/>
+                </a:solidFill>
+                <a:latin typeface="+mj-lt"/>
+                <a:ea typeface="+mj-ea"/>
+                <a:cs typeface="+mj-cs"/>
+              </a:rPr>
+              <a:t>Training my model</a:t>
+            </a:r>
+          </a:p>
+        </p:txBody>
+      </p:sp>
+      <p:pic>
+        <p:nvPicPr>
+          <p:cNvPr id="5" name="Content Placeholder 4">
+            <a:extLst>
+              <a:ext uri="{FF2B5EF4-FFF2-40B4-BE49-F238E27FC236}">
+                <a16:creationId xmlns:a16="http://schemas.microsoft.com/office/drawing/2014/main" id="{DB17AD2B-3A8C-7673-1758-C4851742EF18}"/>
+              </a:ext>
+            </a:extLst>
+          </p:cNvPr>
+          <p:cNvPicPr>
+            <a:picLocks noGrp="1" noChangeAspect="1"/>
+          </p:cNvPicPr>
+          <p:nvPr>
+            <p:ph idx="1"/>
+          </p:nvPr>
+        </p:nvPicPr>
+        <p:blipFill>
+          <a:blip r:embed="rId2"/>
+          <a:stretch>
+            <a:fillRect/>
+          </a:stretch>
+        </p:blipFill>
+        <p:spPr>
+          <a:xfrm>
+            <a:off x="4046527" y="961812"/>
+            <a:ext cx="7172344" cy="4930987"/>
+          </a:xfrm>
+          <a:prstGeom prst="rect">
+            <a:avLst/>
+          </a:prstGeom>
+        </p:spPr>
+      </p:pic>
+    </p:spTree>
+    <p:extLst>
+      <p:ext uri="{BB962C8B-B14F-4D97-AF65-F5344CB8AC3E}">
+        <p14:creationId xmlns:p14="http://schemas.microsoft.com/office/powerpoint/2010/main" val="939207995"/>
+      </p:ext>
+    </p:extLst>
+  </p:cSld>
+  <p:clrMapOvr>
+    <a:masterClrMapping/>
+  </p:clrMapOvr>
+</p:sld>
+</file>
+
+<file path=ppt/slides/slide7.xml><?xml version="1.0" encoding="utf-8"?>
+<p:sld xmlns:a="http://schemas.openxmlformats.org/drawingml/2006/main" xmlns:r="http://schemas.openxmlformats.org/officeDocument/2006/relationships" xmlns:p="http://schemas.openxmlformats.org/presentationml/2006/main">
+  <p:cSld>
+    <p:spTree>
+      <p:nvGrpSpPr>
+        <p:cNvPr id="1" name=""/>
+        <p:cNvGrpSpPr/>
+        <p:nvPr/>
+      </p:nvGrpSpPr>
+      <p:grpSpPr>
+        <a:xfrm>
+          <a:off x="0" y="0"/>
+          <a:ext cx="0" cy="0"/>
+          <a:chOff x="0" y="0"/>
+          <a:chExt cx="0" cy="0"/>
+        </a:xfrm>
+      </p:grpSpPr>
+      <p:sp>
+        <p:nvSpPr>
+          <p:cNvPr id="2" name="Title 1">
+            <a:extLst>
+              <a:ext uri="{FF2B5EF4-FFF2-40B4-BE49-F238E27FC236}">
+                <a16:creationId xmlns:a16="http://schemas.microsoft.com/office/drawing/2014/main" id="{CB41B99E-A151-386A-2D82-899B4E94D42E}"/>
+              </a:ext>
+            </a:extLst>
+          </p:cNvPr>
+          <p:cNvSpPr>
+            <a:spLocks noGrp="1"/>
+          </p:cNvSpPr>
+          <p:nvPr>
+            <p:ph type="title"/>
+          </p:nvPr>
+        </p:nvSpPr>
+        <p:spPr/>
+        <p:txBody>
+          <a:bodyPr/>
+          <a:lstStyle/>
+          <a:p>
+            <a:pPr algn="ctr"/>
+            <a:r>
+              <a:rPr lang="en-US" dirty="0"/>
+              <a:t>Predicting and evaluation</a:t>
+            </a:r>
+          </a:p>
+        </p:txBody>
+      </p:sp>
+      <p:pic>
+        <p:nvPicPr>
+          <p:cNvPr id="6" name="Content Placeholder 5">
+            <a:extLst>
+              <a:ext uri="{FF2B5EF4-FFF2-40B4-BE49-F238E27FC236}">
+                <a16:creationId xmlns:a16="http://schemas.microsoft.com/office/drawing/2014/main" id="{2EFFB206-39E2-61A0-D9D4-1139DE265F75}"/>
+              </a:ext>
+            </a:extLst>
+          </p:cNvPr>
+          <p:cNvPicPr>
+            <a:picLocks noGrp="1" noChangeAspect="1"/>
+          </p:cNvPicPr>
+          <p:nvPr>
+            <p:ph sz="half" idx="1"/>
+          </p:nvPr>
+        </p:nvPicPr>
+        <p:blipFill>
+          <a:blip r:embed="rId2"/>
+          <a:stretch>
+            <a:fillRect/>
+          </a:stretch>
+        </p:blipFill>
+        <p:spPr>
+          <a:xfrm>
+            <a:off x="838200" y="1690688"/>
+            <a:ext cx="5181600" cy="4486275"/>
+          </a:xfrm>
+        </p:spPr>
+      </p:pic>
+      <p:pic>
+        <p:nvPicPr>
+          <p:cNvPr id="8" name="Content Placeholder 7">
+            <a:extLst>
+              <a:ext uri="{FF2B5EF4-FFF2-40B4-BE49-F238E27FC236}">
+                <a16:creationId xmlns:a16="http://schemas.microsoft.com/office/drawing/2014/main" id="{8B798E46-6C64-51AA-5264-020458B22DDA}"/>
+              </a:ext>
+            </a:extLst>
+          </p:cNvPr>
+          <p:cNvPicPr>
+            <a:picLocks noGrp="1" noChangeAspect="1"/>
+          </p:cNvPicPr>
+          <p:nvPr>
+            <p:ph sz="half" idx="2"/>
+          </p:nvPr>
+        </p:nvPicPr>
+        <p:blipFill>
+          <a:blip r:embed="rId3"/>
+          <a:stretch>
+            <a:fillRect/>
+          </a:stretch>
+        </p:blipFill>
+        <p:spPr>
+          <a:xfrm>
+            <a:off x="6172200" y="1600201"/>
+            <a:ext cx="5181600" cy="4576762"/>
+          </a:xfrm>
+        </p:spPr>
+      </p:pic>
+    </p:spTree>
+    <p:extLst>
+      <p:ext uri="{BB962C8B-B14F-4D97-AF65-F5344CB8AC3E}">
+        <p14:creationId xmlns:p14="http://schemas.microsoft.com/office/powerpoint/2010/main" val="3593044354"/>
+      </p:ext>
+    </p:extLst>
+  </p:cSld>
+  <p:clrMapOvr>
+    <a:masterClrMapping/>
+  </p:clrMapOvr>
+</p:sld>
+</file>
+
+<file path=ppt/slides/slide8.xml><?xml version="1.0" encoding="utf-8"?>
+<p:sld xmlns:a="http://schemas.openxmlformats.org/drawingml/2006/main" xmlns:r="http://schemas.openxmlformats.org/officeDocument/2006/relationships" xmlns:p="http://schemas.openxmlformats.org/presentationml/2006/main">
+  <p:cSld>
+    <p:spTree>
+      <p:nvGrpSpPr>
+        <p:cNvPr id="1" name=""/>
+        <p:cNvGrpSpPr/>
+        <p:nvPr/>
+      </p:nvGrpSpPr>
+      <p:grpSpPr>
+        <a:xfrm>
+          <a:off x="0" y="0"/>
+          <a:ext cx="0" cy="0"/>
+          <a:chOff x="0" y="0"/>
+          <a:chExt cx="0" cy="0"/>
+        </a:xfrm>
+      </p:grpSpPr>
+      <p:sp>
+        <p:nvSpPr>
+          <p:cNvPr id="2" name="Title 1">
+            <a:extLst>
+              <a:ext uri="{FF2B5EF4-FFF2-40B4-BE49-F238E27FC236}">
+                <a16:creationId xmlns:a16="http://schemas.microsoft.com/office/drawing/2014/main" id="{770FF0E1-5482-2020-EEF1-8DCBFCF88CD5}"/>
+              </a:ext>
+            </a:extLst>
+          </p:cNvPr>
+          <p:cNvSpPr>
+            <a:spLocks noGrp="1"/>
+          </p:cNvSpPr>
+          <p:nvPr>
+            <p:ph type="title"/>
+          </p:nvPr>
+        </p:nvSpPr>
+        <p:spPr/>
+        <p:txBody>
+          <a:bodyPr/>
+          <a:lstStyle/>
+          <a:p>
+            <a:pPr algn="ctr"/>
+            <a:r>
+              <a:rPr lang="en-US" dirty="0"/>
+              <a:t>Conclusion</a:t>
+            </a:r>
+          </a:p>
+        </p:txBody>
+      </p:sp>
+      <p:sp>
+        <p:nvSpPr>
+          <p:cNvPr id="3" name="Content Placeholder 2">
+            <a:extLst>
+              <a:ext uri="{FF2B5EF4-FFF2-40B4-BE49-F238E27FC236}">
+                <a16:creationId xmlns:a16="http://schemas.microsoft.com/office/drawing/2014/main" id="{8B2C12D1-EE1B-D175-BCD1-0ABFC6E16D91}"/>
+              </a:ext>
+            </a:extLst>
+          </p:cNvPr>
+          <p:cNvSpPr>
+            <a:spLocks noGrp="1"/>
+          </p:cNvSpPr>
+          <p:nvPr>
+            <p:ph idx="1"/>
+          </p:nvPr>
+        </p:nvSpPr>
+        <p:spPr>
+          <a:xfrm>
+            <a:off x="838200" y="1825625"/>
+            <a:ext cx="6727371" cy="4351338"/>
+          </a:xfrm>
+        </p:spPr>
+        <p:txBody>
+          <a:bodyPr>
+            <a:normAutofit fontScale="92500" lnSpcReduction="10000"/>
+          </a:bodyPr>
+          <a:lstStyle/>
+          <a:p>
+            <a:r>
+              <a:rPr lang="en-US" dirty="0"/>
+              <a:t>The model coefficients show the impact of each feature on yearly customer spending. Typically, </a:t>
+            </a:r>
+            <a:r>
+              <a:rPr lang="en-US" b="1" dirty="0"/>
+              <a:t>Time on App</a:t>
+            </a:r>
+            <a:r>
+              <a:rPr lang="en-US" dirty="0"/>
+              <a:t> has a higher positive coefficient than </a:t>
+            </a:r>
+            <a:r>
+              <a:rPr lang="en-US" b="1" dirty="0"/>
+              <a:t>Time on Website</a:t>
+            </a:r>
+            <a:r>
+              <a:rPr lang="en-US" dirty="0"/>
+              <a:t>, indicating that increasing the time customers spend on the app is more strongly associated with higher yearly spending. Additionally, </a:t>
+            </a:r>
+            <a:r>
+              <a:rPr lang="en-US" b="1" dirty="0"/>
+              <a:t>Length of Membership</a:t>
+            </a:r>
+            <a:r>
+              <a:rPr lang="en-US" dirty="0"/>
+              <a:t> also shows a strong positive relationship with spending, suggesting that retaining customers and encouraging longer memberships is highly valuable.</a:t>
+            </a:r>
+          </a:p>
+        </p:txBody>
+      </p:sp>
+      <p:pic>
+        <p:nvPicPr>
+          <p:cNvPr id="5" name="Picture 4">
+            <a:extLst>
+              <a:ext uri="{FF2B5EF4-FFF2-40B4-BE49-F238E27FC236}">
+                <a16:creationId xmlns:a16="http://schemas.microsoft.com/office/drawing/2014/main" id="{D479323F-A06F-1524-7E03-D210B937F85B}"/>
+              </a:ext>
+            </a:extLst>
+          </p:cNvPr>
+          <p:cNvPicPr>
+            <a:picLocks noChangeAspect="1"/>
+          </p:cNvPicPr>
+          <p:nvPr/>
+        </p:nvPicPr>
+        <p:blipFill>
+          <a:blip r:embed="rId2"/>
+          <a:stretch>
+            <a:fillRect/>
+          </a:stretch>
+        </p:blipFill>
+        <p:spPr>
+          <a:xfrm>
+            <a:off x="7565571" y="1596231"/>
+            <a:ext cx="4419600" cy="3650684"/>
+          </a:xfrm>
+          <a:prstGeom prst="rect">
+            <a:avLst/>
+          </a:prstGeom>
+        </p:spPr>
+      </p:pic>
+    </p:spTree>
+    <p:extLst>
+      <p:ext uri="{BB962C8B-B14F-4D97-AF65-F5344CB8AC3E}">
+        <p14:creationId xmlns:p14="http://schemas.microsoft.com/office/powerpoint/2010/main" val="1164507845"/>
       </p:ext>
     </p:extLst>
   </p:cSld>

</xml_diff>